<commit_message>
re-organize intro and related work, cut for space in data
</commit_message>
<xml_diff>
--- a/figures/pic_raw.pptx
+++ b/figures/pic_raw.pptx
@@ -5,12 +5,13 @@
     <p:sldMasterId id="2147483648" r:id="rId1"/>
   </p:sldMasterIdLst>
   <p:notesMasterIdLst>
-    <p:notesMasterId r:id="rId5"/>
+    <p:notesMasterId r:id="rId6"/>
   </p:notesMasterIdLst>
   <p:sldIdLst>
     <p:sldId id="257" r:id="rId2"/>
     <p:sldId id="258" r:id="rId3"/>
     <p:sldId id="259" r:id="rId4"/>
+    <p:sldId id="260" r:id="rId5"/>
   </p:sldIdLst>
   <p:sldSz cx="18143538" cy="6858000"/>
   <p:notesSz cx="6858000" cy="9144000"/>
@@ -870,6 +871,101 @@
     <p:extLst>
       <p:ext uri="{BB962C8B-B14F-4D97-AF65-F5344CB8AC3E}">
         <p14:creationId xmlns:p14="http://schemas.microsoft.com/office/powerpoint/2010/main" val="1069755936"/>
+      </p:ext>
+    </p:extLst>
+  </p:cSld>
+  <p:clrMapOvr>
+    <a:masterClrMapping/>
+  </p:clrMapOvr>
+</p:notes>
+</file>
+
+<file path=ppt/notesSlides/notesSlide4.xml><?xml version="1.0" encoding="utf-8"?>
+<p:notes xmlns:a="http://schemas.openxmlformats.org/drawingml/2006/main" xmlns:r="http://schemas.openxmlformats.org/officeDocument/2006/relationships" xmlns:p="http://schemas.openxmlformats.org/presentationml/2006/main">
+  <p:cSld>
+    <p:spTree>
+      <p:nvGrpSpPr>
+        <p:cNvPr id="1" name=""/>
+        <p:cNvGrpSpPr/>
+        <p:nvPr/>
+      </p:nvGrpSpPr>
+      <p:grpSpPr>
+        <a:xfrm>
+          <a:off x="0" y="0"/>
+          <a:ext cx="0" cy="0"/>
+          <a:chOff x="0" y="0"/>
+          <a:chExt cx="0" cy="0"/>
+        </a:xfrm>
+      </p:grpSpPr>
+      <p:sp>
+        <p:nvSpPr>
+          <p:cNvPr id="2" name="幻灯片图像占位符 1"/>
+          <p:cNvSpPr>
+            <a:spLocks noGrp="1" noRot="1" noChangeAspect="1"/>
+          </p:cNvSpPr>
+          <p:nvPr>
+            <p:ph type="sldImg"/>
+          </p:nvPr>
+        </p:nvSpPr>
+        <p:spPr>
+          <a:xfrm>
+            <a:off x="-1106488" y="685800"/>
+            <a:ext cx="9070976" cy="3429000"/>
+          </a:xfrm>
+        </p:spPr>
+      </p:sp>
+      <p:sp>
+        <p:nvSpPr>
+          <p:cNvPr id="3" name="备注占位符 2"/>
+          <p:cNvSpPr>
+            <a:spLocks noGrp="1"/>
+          </p:cNvSpPr>
+          <p:nvPr>
+            <p:ph type="body" idx="1"/>
+          </p:nvPr>
+        </p:nvSpPr>
+        <p:spPr/>
+        <p:txBody>
+          <a:bodyPr/>
+          <a:lstStyle/>
+          <a:p>
+            <a:endParaRPr kumimoji="1" lang="zh-CN" altLang="en-US" dirty="0"/>
+          </a:p>
+        </p:txBody>
+      </p:sp>
+      <p:sp>
+        <p:nvSpPr>
+          <p:cNvPr id="4" name="幻灯片编号占位符 3"/>
+          <p:cNvSpPr>
+            <a:spLocks noGrp="1"/>
+          </p:cNvSpPr>
+          <p:nvPr>
+            <p:ph type="sldNum" sz="quarter" idx="10"/>
+          </p:nvPr>
+        </p:nvSpPr>
+        <p:spPr/>
+        <p:txBody>
+          <a:bodyPr/>
+          <a:lstStyle/>
+          <a:p>
+            <a:pPr>
+              <a:defRPr/>
+            </a:pPr>
+            <a:fld id="{37FC56A9-71FA-49A8-A49B-73E0C4B6E024}" type="slidenum">
+              <a:rPr lang="en-US" smtClean="0"/>
+              <a:pPr>
+                <a:defRPr/>
+              </a:pPr>
+              <a:t>4</a:t>
+            </a:fld>
+            <a:endParaRPr lang="en-US"/>
+          </a:p>
+        </p:txBody>
+      </p:sp>
+    </p:spTree>
+    <p:extLst>
+      <p:ext uri="{BB962C8B-B14F-4D97-AF65-F5344CB8AC3E}">
+        <p14:creationId xmlns:p14="http://schemas.microsoft.com/office/powerpoint/2010/main" val="1737518944"/>
       </p:ext>
     </p:extLst>
   </p:cSld>
@@ -8916,6 +9012,1180 @@
     <p:extLst>
       <p:ext uri="{BB962C8B-B14F-4D97-AF65-F5344CB8AC3E}">
         <p14:creationId xmlns:p14="http://schemas.microsoft.com/office/powerpoint/2010/main" val="1876855542"/>
+      </p:ext>
+    </p:extLst>
+  </p:cSld>
+  <p:clrMapOvr>
+    <a:masterClrMapping/>
+  </p:clrMapOvr>
+</p:sld>
+</file>
+
+<file path=ppt/slides/slide4.xml><?xml version="1.0" encoding="utf-8"?>
+<p:sld xmlns:a="http://schemas.openxmlformats.org/drawingml/2006/main" xmlns:r="http://schemas.openxmlformats.org/officeDocument/2006/relationships" xmlns:p="http://schemas.openxmlformats.org/presentationml/2006/main">
+  <p:cSld>
+    <p:spTree>
+      <p:nvGrpSpPr>
+        <p:cNvPr id="1" name=""/>
+        <p:cNvGrpSpPr/>
+        <p:nvPr/>
+      </p:nvGrpSpPr>
+      <p:grpSpPr>
+        <a:xfrm>
+          <a:off x="0" y="0"/>
+          <a:ext cx="0" cy="0"/>
+          <a:chOff x="0" y="0"/>
+          <a:chExt cx="0" cy="0"/>
+        </a:xfrm>
+      </p:grpSpPr>
+      <p:sp>
+        <p:nvSpPr>
+          <p:cNvPr id="7" name="Rectangle 1"/>
+          <p:cNvSpPr>
+            <a:spLocks noChangeArrowheads="1"/>
+          </p:cNvSpPr>
+          <p:nvPr/>
+        </p:nvSpPr>
+        <p:spPr bwMode="auto">
+          <a:xfrm>
+            <a:off x="7629215" y="620688"/>
+            <a:ext cx="4608512" cy="369332"/>
+          </a:xfrm>
+          <a:prstGeom prst="rect">
+            <a:avLst/>
+          </a:prstGeom>
+          <a:noFill/>
+          <a:ln>
+            <a:noFill/>
+          </a:ln>
+          <a:effectLst/>
+          <a:extLst>
+            <a:ext uri="{909E8E84-426E-40DD-AFC4-6F175D3DCCD1}">
+              <a14:hiddenFill xmlns:a14="http://schemas.microsoft.com/office/drawing/2010/main">
+                <a:solidFill>
+                  <a:schemeClr val="accent1"/>
+                </a:solidFill>
+              </a14:hiddenFill>
+            </a:ext>
+            <a:ext uri="{91240B29-F687-4F45-9708-019B960494DF}">
+              <a14:hiddenLine xmlns:a14="http://schemas.microsoft.com/office/drawing/2010/main" w="9525">
+                <a:solidFill>
+                  <a:schemeClr val="tx1"/>
+                </a:solidFill>
+                <a:miter lim="800000"/>
+                <a:headEnd/>
+                <a:tailEnd/>
+              </a14:hiddenLine>
+            </a:ext>
+            <a:ext uri="{AF507438-7753-43E0-B8FC-AC1667EBCBE1}">
+              <a14:hiddenEffects xmlns:a14="http://schemas.microsoft.com/office/drawing/2010/main">
+                <a:effectLst>
+                  <a:outerShdw blurRad="63500" dist="38099" dir="2700000" algn="ctr" rotWithShape="0">
+                    <a:schemeClr val="bg2">
+                      <a:alpha val="74998"/>
+                    </a:schemeClr>
+                  </a:outerShdw>
+                </a:effectLst>
+              </a14:hiddenEffects>
+            </a:ext>
+          </a:extLst>
+        </p:spPr>
+        <p:txBody>
+          <a:bodyPr vert="horz" wrap="square" lIns="91440" tIns="45720" rIns="91440" bIns="0" numCol="1" anchor="ctr" anchorCtr="0" compatLnSpc="1">
+            <a:prstTxWarp prst="textNoShape">
+              <a:avLst/>
+            </a:prstTxWarp>
+            <a:spAutoFit/>
+          </a:bodyPr>
+          <a:lstStyle/>
+          <a:p>
+            <a:r>
+              <a:rPr lang="en-US" altLang="zh-CN" sz="1050" dirty="0"/>
+              <a:t>The People’s Procuratorate of Weishi</a:t>
+            </a:r>
+            <a:r>
+              <a:rPr lang="en-US" altLang="zh-CN" sz="1050" dirty="0"/>
+              <a:t> County </a:t>
+            </a:r>
+            <a:r>
+              <a:rPr lang="en-US" altLang="zh-CN" sz="1050" dirty="0"/>
+              <a:t>prosecuted the </a:t>
+            </a:r>
+            <a:r>
+              <a:rPr lang="en-US" altLang="zh-CN" sz="1050" dirty="0"/>
+              <a:t>defendant </a:t>
+            </a:r>
+            <a:r>
+              <a:rPr lang="en-US" altLang="zh-CN" sz="1050" dirty="0" smtClean="0"/>
+              <a:t>AA </a:t>
+            </a:r>
+            <a:r>
+              <a:rPr lang="en-US" altLang="zh-CN" sz="1050" dirty="0"/>
+              <a:t>for </a:t>
+            </a:r>
+            <a:r>
+              <a:rPr lang="en-US" altLang="zh-CN" sz="1050" dirty="0"/>
+              <a:t>robbery on November 16</a:t>
+            </a:r>
+            <a:r>
+              <a:rPr lang="en-US" altLang="zh-CN" sz="1050" baseline="30000" dirty="0"/>
+              <a:t>th</a:t>
+            </a:r>
+            <a:r>
+              <a:rPr lang="en-US" altLang="zh-CN" sz="1050" dirty="0"/>
+              <a:t>, 2011. </a:t>
+            </a:r>
+            <a:r>
+              <a:rPr lang="en-US" altLang="zh-CN" sz="1050" dirty="0"/>
+              <a:t>… </a:t>
+            </a:r>
+            <a:r>
+              <a:rPr lang="en-US" altLang="zh-CN" sz="1050" dirty="0"/>
+              <a:t>The case is decided now.</a:t>
+            </a:r>
+            <a:endParaRPr lang="zh-CN" altLang="zh-CN" sz="1050" dirty="0"/>
+          </a:p>
+        </p:txBody>
+      </p:sp>
+      <p:sp>
+        <p:nvSpPr>
+          <p:cNvPr id="11" name="矩形 10"/>
+          <p:cNvSpPr/>
+          <p:nvPr/>
+        </p:nvSpPr>
+        <p:spPr>
+          <a:xfrm>
+            <a:off x="7629215" y="1052736"/>
+            <a:ext cx="4464496" cy="738664"/>
+          </a:xfrm>
+          <a:prstGeom prst="rect">
+            <a:avLst/>
+          </a:prstGeom>
+        </p:spPr>
+        <p:txBody>
+          <a:bodyPr wrap="square">
+            <a:spAutoFit/>
+          </a:bodyPr>
+          <a:lstStyle/>
+          <a:p>
+            <a:pPr>
+              <a:spcAft>
+                <a:spcPts val="0"/>
+              </a:spcAft>
+            </a:pPr>
+            <a:r>
+              <a:rPr lang="en-US" altLang="zh-CN" sz="1050" dirty="0">
+                <a:ea typeface="Arial" charset="0"/>
+              </a:rPr>
+              <a:t>After hearing, </a:t>
+            </a:r>
+            <a:r>
+              <a:rPr lang="en-US" altLang="zh-CN" sz="1050" dirty="0">
+                <a:ea typeface="Arial" charset="0"/>
+              </a:rPr>
+              <a:t>our </a:t>
+            </a:r>
+            <a:r>
+              <a:rPr lang="en-US" altLang="zh-CN" sz="1050" dirty="0">
+                <a:ea typeface="Arial" charset="0"/>
+              </a:rPr>
+              <a:t>court identified that the defendant </a:t>
+            </a:r>
+            <a:r>
+              <a:rPr lang="en-US" altLang="zh-CN" sz="1050" dirty="0" smtClean="0">
+                <a:ea typeface="Arial" charset="0"/>
+              </a:rPr>
+              <a:t>AA </a:t>
+            </a:r>
+            <a:r>
+              <a:rPr lang="en-US" altLang="zh-CN" sz="1050" dirty="0">
+                <a:ea typeface="Arial" charset="0"/>
+              </a:rPr>
+              <a:t>got spotted by the victim </a:t>
+            </a:r>
+            <a:r>
+              <a:rPr lang="en-US" altLang="zh-CN" sz="1050" dirty="0" smtClean="0">
+                <a:ea typeface="Arial" charset="0"/>
+              </a:rPr>
+              <a:t>BB </a:t>
+            </a:r>
+            <a:r>
+              <a:rPr lang="en-US" altLang="zh-CN" sz="1050" dirty="0">
+                <a:ea typeface="Arial" charset="0"/>
+              </a:rPr>
+              <a:t>when he was trying to </a:t>
+            </a:r>
+            <a:r>
+              <a:rPr lang="en-US" altLang="zh-CN" sz="1050" dirty="0">
+                <a:ea typeface="Arial" charset="0"/>
+              </a:rPr>
+              <a:t>steel the </a:t>
+            </a:r>
+            <a:r>
+              <a:rPr lang="en-US" altLang="zh-CN" sz="1050" dirty="0">
+                <a:ea typeface="Arial" charset="0"/>
+              </a:rPr>
+              <a:t>battery of an agricultural vehicle </a:t>
+            </a:r>
+            <a:r>
+              <a:rPr lang="en-US" altLang="zh-CN" sz="1050" dirty="0">
+                <a:ea typeface="Arial" charset="0"/>
+              </a:rPr>
+              <a:t>on </a:t>
+            </a:r>
+            <a:r>
+              <a:rPr lang="en-US" altLang="zh-CN" sz="1050" dirty="0">
+                <a:ea typeface="Arial" charset="0"/>
+              </a:rPr>
+              <a:t>the morning of October 6</a:t>
+            </a:r>
+            <a:r>
+              <a:rPr lang="en-US" altLang="zh-CN" sz="1050" baseline="30000" dirty="0">
+                <a:ea typeface="Arial" charset="0"/>
+              </a:rPr>
+              <a:t>th</a:t>
+            </a:r>
+            <a:r>
+              <a:rPr lang="en-US" altLang="zh-CN" sz="1050" dirty="0">
+                <a:ea typeface="Arial" charset="0"/>
+              </a:rPr>
+              <a:t>, 2011. </a:t>
+            </a:r>
+            <a:r>
+              <a:rPr lang="en-US" altLang="zh-CN" sz="1050" dirty="0" smtClean="0">
+                <a:ea typeface="Arial" charset="0"/>
+              </a:rPr>
+              <a:t>AA wounded</a:t>
+            </a:r>
+            <a:r>
+              <a:rPr lang="zh-CN" altLang="en-US" sz="1050" dirty="0" smtClean="0">
+                <a:ea typeface="Arial" charset="0"/>
+              </a:rPr>
+              <a:t> </a:t>
+            </a:r>
+            <a:r>
+              <a:rPr lang="en-US" altLang="zh-CN" sz="1050" dirty="0" smtClean="0">
+                <a:ea typeface="Arial" charset="0"/>
+              </a:rPr>
+              <a:t>BB </a:t>
+            </a:r>
+            <a:r>
+              <a:rPr lang="en-US" altLang="zh-CN" sz="1050" dirty="0">
+                <a:ea typeface="Arial" charset="0"/>
+              </a:rPr>
+              <a:t>with a knife while </a:t>
+            </a:r>
+            <a:r>
+              <a:rPr lang="en-US" altLang="zh-CN" sz="1050" dirty="0" smtClean="0">
+                <a:ea typeface="Arial" charset="0"/>
+              </a:rPr>
+              <a:t>BB </a:t>
+            </a:r>
+            <a:r>
+              <a:rPr lang="en-US" altLang="zh-CN" sz="1050" dirty="0">
+                <a:ea typeface="Arial" charset="0"/>
+              </a:rPr>
+              <a:t>was trying to catch him. </a:t>
+            </a:r>
+            <a:r>
+              <a:rPr lang="en-US" altLang="zh-CN" sz="1050" dirty="0">
+                <a:ea typeface="Arial" charset="0"/>
+              </a:rPr>
+              <a:t>……</a:t>
+            </a:r>
+            <a:endParaRPr lang="zh-CN" altLang="zh-CN" sz="1050" dirty="0">
+              <a:ea typeface="Arial" charset="0"/>
+            </a:endParaRPr>
+          </a:p>
+        </p:txBody>
+      </p:sp>
+      <p:sp>
+        <p:nvSpPr>
+          <p:cNvPr id="13" name="矩形 12"/>
+          <p:cNvSpPr/>
+          <p:nvPr/>
+        </p:nvSpPr>
+        <p:spPr>
+          <a:xfrm>
+            <a:off x="7629216" y="1800940"/>
+            <a:ext cx="4556700" cy="738664"/>
+          </a:xfrm>
+          <a:prstGeom prst="rect">
+            <a:avLst/>
+          </a:prstGeom>
+        </p:spPr>
+        <p:txBody>
+          <a:bodyPr wrap="square">
+            <a:spAutoFit/>
+          </a:bodyPr>
+          <a:lstStyle/>
+          <a:p>
+            <a:pPr>
+              <a:spcAft>
+                <a:spcPts val="0"/>
+              </a:spcAft>
+            </a:pPr>
+            <a:r>
+              <a:rPr lang="en-US" altLang="zh-CN" sz="1050" dirty="0" smtClean="0">
+                <a:ea typeface="Arial" charset="0"/>
+              </a:rPr>
+              <a:t>Our court hold that, the defendant AA caused</a:t>
+            </a:r>
+            <a:r>
+              <a:rPr lang="zh-CN" altLang="en-US" sz="1050" dirty="0" smtClean="0">
+                <a:ea typeface="Arial" charset="0"/>
+              </a:rPr>
+              <a:t> </a:t>
+            </a:r>
+            <a:r>
+              <a:rPr lang="en-US" altLang="zh-CN" sz="1050" dirty="0" smtClean="0">
+                <a:ea typeface="Arial" charset="0"/>
+              </a:rPr>
+              <a:t>BB minor wound </a:t>
+            </a:r>
+            <a:r>
+              <a:rPr lang="en-US" altLang="zh-CN" sz="1050" dirty="0" smtClean="0">
+                <a:ea typeface="Arial" charset="0"/>
+              </a:rPr>
+              <a:t>during</a:t>
+            </a:r>
+            <a:r>
+              <a:rPr lang="zh-CN" altLang="en-US" sz="1050" dirty="0" smtClean="0">
+                <a:ea typeface="Arial" charset="0"/>
+              </a:rPr>
+              <a:t> </a:t>
+            </a:r>
+            <a:r>
+              <a:rPr lang="en-US" altLang="zh-CN" sz="1050" dirty="0" smtClean="0">
+                <a:ea typeface="Arial" charset="0"/>
+              </a:rPr>
+              <a:t>the</a:t>
+            </a:r>
+            <a:r>
+              <a:rPr lang="zh-CN" altLang="en-US" sz="1050" dirty="0" smtClean="0">
+                <a:ea typeface="Arial" charset="0"/>
+              </a:rPr>
+              <a:t> </a:t>
+            </a:r>
+            <a:r>
+              <a:rPr lang="en-US" altLang="zh-CN" sz="1050" dirty="0" smtClean="0">
+                <a:ea typeface="Arial" charset="0"/>
+              </a:rPr>
+              <a:t>process</a:t>
+            </a:r>
+            <a:r>
+              <a:rPr lang="zh-CN" altLang="en-US" sz="1050" dirty="0" smtClean="0">
+                <a:ea typeface="Arial" charset="0"/>
+              </a:rPr>
+              <a:t> </a:t>
+            </a:r>
+            <a:r>
+              <a:rPr lang="en-US" altLang="zh-CN" sz="1050" dirty="0" smtClean="0">
+                <a:ea typeface="Arial" charset="0"/>
+              </a:rPr>
+              <a:t>of stealing</a:t>
+            </a:r>
+            <a:r>
+              <a:rPr lang="en-US" altLang="zh-CN" sz="1050" dirty="0" smtClean="0">
+                <a:ea typeface="Arial" charset="0"/>
+              </a:rPr>
+              <a:t>.</a:t>
+            </a:r>
+            <a:r>
+              <a:rPr lang="zh-CN" altLang="en-US" sz="1050" dirty="0" smtClean="0">
+                <a:ea typeface="Arial" charset="0"/>
+              </a:rPr>
+              <a:t> </a:t>
+            </a:r>
+            <a:r>
+              <a:rPr lang="en-US" altLang="zh-CN" sz="1050" dirty="0" smtClean="0">
+                <a:ea typeface="Arial" charset="0"/>
+              </a:rPr>
+              <a:t>His</a:t>
+            </a:r>
+            <a:r>
+              <a:rPr lang="zh-CN" altLang="en-US" sz="1050" dirty="0" smtClean="0">
+                <a:ea typeface="Arial" charset="0"/>
+              </a:rPr>
+              <a:t> </a:t>
+            </a:r>
+            <a:r>
+              <a:rPr lang="en-US" altLang="zh-CN" sz="1050" dirty="0" smtClean="0">
+                <a:ea typeface="Arial" charset="0"/>
+              </a:rPr>
+              <a:t>acts constituted the crime of robbery. …… According to the </a:t>
+            </a:r>
+            <a:r>
+              <a:rPr lang="en-US" altLang="zh-CN" sz="1050" b="1" dirty="0" smtClean="0">
+                <a:solidFill>
+                  <a:srgbClr val="0070C0"/>
+                </a:solidFill>
+                <a:ea typeface="Arial" charset="0"/>
+              </a:rPr>
+              <a:t>Article 263</a:t>
+            </a:r>
+            <a:r>
+              <a:rPr lang="en-US" altLang="zh-CN" sz="1050" dirty="0" smtClean="0">
+                <a:ea typeface="Arial" charset="0"/>
+              </a:rPr>
+              <a:t>, </a:t>
+            </a:r>
+            <a:r>
+              <a:rPr lang="en-US" altLang="zh-CN" sz="1050" b="1" dirty="0" smtClean="0">
+                <a:solidFill>
+                  <a:srgbClr val="0070C0"/>
+                </a:solidFill>
+                <a:ea typeface="Arial" charset="0"/>
+              </a:rPr>
+              <a:t>Article 269</a:t>
+            </a:r>
+            <a:r>
+              <a:rPr lang="en-US" altLang="zh-CN" sz="1050" dirty="0" smtClean="0">
+                <a:ea typeface="Arial" charset="0"/>
+              </a:rPr>
+              <a:t>, </a:t>
+            </a:r>
+            <a:r>
+              <a:rPr lang="is-IS" altLang="zh-CN" sz="1050" dirty="0" smtClean="0">
+                <a:ea typeface="Arial" charset="0"/>
+              </a:rPr>
+              <a:t>…</a:t>
+            </a:r>
+            <a:r>
+              <a:rPr lang="zh-CN" altLang="en-US" sz="1050" dirty="0" smtClean="0">
+                <a:ea typeface="Arial" charset="0"/>
+              </a:rPr>
+              <a:t> </a:t>
+            </a:r>
+            <a:r>
+              <a:rPr lang="en-US" altLang="zh-CN" sz="1050" dirty="0" smtClean="0">
+                <a:ea typeface="Arial" charset="0"/>
+              </a:rPr>
+              <a:t>of </a:t>
+            </a:r>
+            <a:r>
+              <a:rPr lang="en-US" altLang="zh-CN" sz="1050" b="1" dirty="0" smtClean="0">
+                <a:solidFill>
+                  <a:srgbClr val="0070C0"/>
+                </a:solidFill>
+                <a:ea typeface="Arial" charset="0"/>
+              </a:rPr>
+              <a:t>the Criminal Law of the People’s Republic of China</a:t>
+            </a:r>
+            <a:r>
+              <a:rPr lang="en-US" altLang="zh-CN" sz="1050" dirty="0" smtClean="0">
+                <a:ea typeface="Arial" charset="0"/>
+              </a:rPr>
+              <a:t>, the sentence is as follows:</a:t>
+            </a:r>
+            <a:endParaRPr lang="zh-CN" altLang="zh-CN" sz="1050" dirty="0">
+              <a:ea typeface="Arial" charset="0"/>
+            </a:endParaRPr>
+          </a:p>
+        </p:txBody>
+      </p:sp>
+      <p:sp>
+        <p:nvSpPr>
+          <p:cNvPr id="15" name="文本框 14"/>
+          <p:cNvSpPr txBox="1"/>
+          <p:nvPr/>
+        </p:nvSpPr>
+        <p:spPr>
+          <a:xfrm>
+            <a:off x="3527153" y="1800941"/>
+            <a:ext cx="3975441" cy="938719"/>
+          </a:xfrm>
+          <a:prstGeom prst="rect">
+            <a:avLst/>
+          </a:prstGeom>
+          <a:noFill/>
+        </p:spPr>
+        <p:txBody>
+          <a:bodyPr wrap="square" rtlCol="0">
+            <a:spAutoFit/>
+          </a:bodyPr>
+          <a:lstStyle/>
+          <a:p>
+            <a:pPr lvl="0"/>
+            <a:r>
+              <a:rPr lang="zh-CN" altLang="zh-CN" sz="1100" dirty="0">
+                <a:latin typeface="Arial Unicode MS" charset="0"/>
+                <a:ea typeface="Courier New" charset="0"/>
+              </a:rPr>
+              <a:t>本院认为，</a:t>
+            </a:r>
+            <a:r>
+              <a:rPr lang="zh-CN" altLang="zh-CN" sz="1100" dirty="0" smtClean="0">
+                <a:latin typeface="Arial Unicode MS" charset="0"/>
+                <a:ea typeface="Courier New" charset="0"/>
+              </a:rPr>
+              <a:t>被告人</a:t>
+            </a:r>
+            <a:r>
+              <a:rPr lang="en-US" altLang="zh-CN" sz="1100" dirty="0" smtClean="0">
+                <a:latin typeface="Arial Unicode MS" charset="0"/>
+                <a:ea typeface="Courier New" charset="0"/>
+              </a:rPr>
+              <a:t>AA</a:t>
+            </a:r>
+            <a:r>
+              <a:rPr lang="zh-CN" altLang="zh-CN" sz="1100" dirty="0" smtClean="0">
+                <a:latin typeface="Arial Unicode MS" charset="0"/>
+                <a:ea typeface="Courier New" charset="0"/>
+              </a:rPr>
+              <a:t>在</a:t>
+            </a:r>
+            <a:r>
+              <a:rPr lang="zh-CN" altLang="zh-CN" sz="1100" dirty="0">
+                <a:latin typeface="Arial Unicode MS" charset="0"/>
+                <a:ea typeface="Courier New" charset="0"/>
+              </a:rPr>
+              <a:t>盗窃过程中携带凶器，为抗拒抓捕而当场使用暴力致</a:t>
+            </a:r>
+            <a:r>
+              <a:rPr lang="zh-CN" altLang="zh-CN" sz="1100" dirty="0" smtClean="0">
+                <a:latin typeface="Arial Unicode MS" charset="0"/>
+                <a:ea typeface="Courier New" charset="0"/>
+              </a:rPr>
+              <a:t>被害人</a:t>
+            </a:r>
+            <a:r>
+              <a:rPr lang="en-US" altLang="zh-CN" sz="1100" dirty="0" smtClean="0">
+                <a:latin typeface="Arial Unicode MS" charset="0"/>
+                <a:ea typeface="Courier New" charset="0"/>
+              </a:rPr>
+              <a:t>BB</a:t>
+            </a:r>
+            <a:r>
+              <a:rPr lang="zh-CN" altLang="zh-CN" sz="1100" dirty="0" smtClean="0">
+                <a:latin typeface="Arial Unicode MS" charset="0"/>
+                <a:ea typeface="Courier New" charset="0"/>
+              </a:rPr>
+              <a:t>轻微</a:t>
+            </a:r>
+            <a:r>
+              <a:rPr lang="zh-CN" altLang="zh-CN" sz="1100" dirty="0">
+                <a:latin typeface="Arial Unicode MS" charset="0"/>
+                <a:ea typeface="Courier New" charset="0"/>
+              </a:rPr>
+              <a:t>伤，其行为已构成抢劫罪，…… 依照</a:t>
+            </a:r>
+            <a:r>
+              <a:rPr lang="zh-CN" altLang="zh-CN" sz="1100" b="1" dirty="0">
+                <a:solidFill>
+                  <a:srgbClr val="0070C0"/>
+                </a:solidFill>
+                <a:latin typeface="Arial Unicode MS" charset="0"/>
+                <a:ea typeface="Courier New" charset="0"/>
+              </a:rPr>
+              <a:t>《中华人民共和国刑法》第二百六十三条</a:t>
+            </a:r>
+            <a:r>
+              <a:rPr lang="zh-CN" altLang="zh-CN" sz="1100" dirty="0">
+                <a:latin typeface="Arial Unicode MS" charset="0"/>
+                <a:ea typeface="Courier New" charset="0"/>
+              </a:rPr>
+              <a:t>、</a:t>
+            </a:r>
+            <a:r>
+              <a:rPr lang="zh-CN" altLang="zh-CN" sz="1100" b="1" dirty="0">
+                <a:solidFill>
+                  <a:srgbClr val="0070C0"/>
+                </a:solidFill>
+                <a:latin typeface="Arial Unicode MS" charset="0"/>
+                <a:ea typeface="Courier New" charset="0"/>
+              </a:rPr>
+              <a:t>第二百六十九条</a:t>
+            </a:r>
+            <a:r>
+              <a:rPr lang="zh-CN" altLang="zh-CN" sz="1100" dirty="0">
+                <a:latin typeface="Arial Unicode MS" charset="0"/>
+                <a:ea typeface="Courier New" charset="0"/>
+              </a:rPr>
+              <a:t>、</a:t>
+            </a:r>
+            <a:r>
+              <a:rPr lang="is-IS" altLang="zh-CN" sz="1100" dirty="0">
+                <a:latin typeface="Arial Unicode MS" charset="0"/>
+                <a:ea typeface="Courier New" charset="0"/>
+              </a:rPr>
+              <a:t>…</a:t>
+            </a:r>
+            <a:r>
+              <a:rPr lang="zh-CN" altLang="zh-CN" sz="1100" dirty="0">
+                <a:latin typeface="Arial Unicode MS" charset="0"/>
+                <a:ea typeface="Courier New" charset="0"/>
+              </a:rPr>
+              <a:t>之</a:t>
+            </a:r>
+            <a:r>
+              <a:rPr lang="zh-CN" altLang="zh-CN" sz="1100" dirty="0">
+                <a:latin typeface="Arial Unicode MS" charset="0"/>
+                <a:ea typeface="Courier New" charset="0"/>
+              </a:rPr>
+              <a:t>规定，判决如下： </a:t>
+            </a:r>
+          </a:p>
+          <a:p>
+            <a:endParaRPr kumimoji="1" lang="zh-CN" altLang="en-US" sz="1100" dirty="0"/>
+          </a:p>
+        </p:txBody>
+      </p:sp>
+      <p:sp>
+        <p:nvSpPr>
+          <p:cNvPr id="17" name="文本框 16"/>
+          <p:cNvSpPr txBox="1"/>
+          <p:nvPr/>
+        </p:nvSpPr>
+        <p:spPr>
+          <a:xfrm>
+            <a:off x="3527153" y="1052737"/>
+            <a:ext cx="3975440" cy="769441"/>
+          </a:xfrm>
+          <a:prstGeom prst="rect">
+            <a:avLst/>
+          </a:prstGeom>
+          <a:noFill/>
+        </p:spPr>
+        <p:txBody>
+          <a:bodyPr wrap="square" rtlCol="0">
+            <a:spAutoFit/>
+          </a:bodyPr>
+          <a:lstStyle/>
+          <a:p>
+            <a:pPr lvl="0"/>
+            <a:r>
+              <a:rPr lang="is-IS" altLang="zh-CN" sz="1100" dirty="0" smtClean="0">
+                <a:latin typeface="Arial Unicode MS" charset="0"/>
+                <a:ea typeface="Courier New" charset="0"/>
+              </a:rPr>
+              <a:t>…</a:t>
+            </a:r>
+            <a:r>
+              <a:rPr lang="zh-CN" altLang="zh-CN" sz="1100" dirty="0" smtClean="0">
+                <a:latin typeface="Arial Unicode MS" charset="0"/>
+                <a:ea typeface="Courier New" charset="0"/>
+              </a:rPr>
+              <a:t>经</a:t>
+            </a:r>
+            <a:r>
+              <a:rPr lang="zh-CN" altLang="zh-CN" sz="1100" dirty="0">
+                <a:latin typeface="Arial Unicode MS" charset="0"/>
+                <a:ea typeface="Courier New" charset="0"/>
+              </a:rPr>
+              <a:t>审理查明，2011年10月6日凌晨，</a:t>
+            </a:r>
+            <a:r>
+              <a:rPr lang="zh-CN" altLang="zh-CN" sz="1100" dirty="0" smtClean="0">
+                <a:latin typeface="Arial Unicode MS" charset="0"/>
+                <a:ea typeface="Courier New" charset="0"/>
+              </a:rPr>
+              <a:t>被告人</a:t>
+            </a:r>
+            <a:r>
+              <a:rPr lang="en-US" altLang="zh-CN" sz="1100" dirty="0" smtClean="0">
+                <a:latin typeface="Arial Unicode MS" charset="0"/>
+                <a:ea typeface="Courier New" charset="0"/>
+              </a:rPr>
+              <a:t>AA</a:t>
+            </a:r>
+            <a:r>
+              <a:rPr lang="zh-CN" altLang="zh-CN" sz="1100" dirty="0" smtClean="0">
+                <a:latin typeface="Arial Unicode MS" charset="0"/>
+                <a:ea typeface="Courier New" charset="0"/>
+              </a:rPr>
+              <a:t>携带</a:t>
+            </a:r>
+            <a:r>
+              <a:rPr lang="zh-CN" altLang="zh-CN" sz="1100" dirty="0">
+                <a:latin typeface="Arial Unicode MS" charset="0"/>
+                <a:ea typeface="Courier New" charset="0"/>
+              </a:rPr>
+              <a:t>改锥、扳手、破坏钳、刀等物品到尉氏县张市镇</a:t>
+            </a:r>
+            <a:r>
+              <a:rPr lang="zh-CN" altLang="zh-CN" sz="1100" dirty="0" smtClean="0">
+                <a:latin typeface="Arial Unicode MS" charset="0"/>
+                <a:ea typeface="Courier New" charset="0"/>
+              </a:rPr>
+              <a:t>尹庄村</a:t>
+            </a:r>
+            <a:r>
+              <a:rPr lang="en-US" altLang="zh-CN" sz="1100" dirty="0" smtClean="0">
+                <a:latin typeface="Arial Unicode MS" charset="0"/>
+                <a:ea typeface="Courier New" charset="0"/>
+              </a:rPr>
+              <a:t>BB</a:t>
+            </a:r>
+            <a:r>
+              <a:rPr lang="zh-CN" altLang="zh-CN" sz="1100" dirty="0" smtClean="0">
+                <a:latin typeface="Arial Unicode MS" charset="0"/>
+                <a:ea typeface="Courier New" charset="0"/>
+              </a:rPr>
+              <a:t>家门口</a:t>
+            </a:r>
+            <a:r>
+              <a:rPr lang="zh-CN" altLang="zh-CN" sz="1100" dirty="0">
+                <a:latin typeface="Arial Unicode MS" charset="0"/>
+                <a:ea typeface="Courier New" charset="0"/>
+              </a:rPr>
+              <a:t>盗窃农用车上的电瓶时被</a:t>
+            </a:r>
+            <a:r>
+              <a:rPr lang="zh-CN" altLang="zh-CN" sz="1100" dirty="0" smtClean="0">
+                <a:latin typeface="Arial Unicode MS" charset="0"/>
+                <a:ea typeface="Courier New" charset="0"/>
+              </a:rPr>
+              <a:t>被害人</a:t>
+            </a:r>
+            <a:r>
+              <a:rPr lang="en-US" altLang="zh-CN" sz="1100" dirty="0" smtClean="0">
+                <a:latin typeface="Arial Unicode MS" charset="0"/>
+                <a:ea typeface="Courier New" charset="0"/>
+              </a:rPr>
+              <a:t>BB</a:t>
+            </a:r>
+            <a:r>
+              <a:rPr lang="zh-CN" altLang="zh-CN" sz="1100" dirty="0" smtClean="0">
+                <a:latin typeface="Arial Unicode MS" charset="0"/>
+                <a:ea typeface="Courier New" charset="0"/>
+              </a:rPr>
+              <a:t>发现</a:t>
+            </a:r>
+            <a:r>
+              <a:rPr lang="zh-CN" altLang="zh-CN" sz="1100" dirty="0">
+                <a:latin typeface="Arial Unicode MS" charset="0"/>
+                <a:ea typeface="Courier New" charset="0"/>
+              </a:rPr>
+              <a:t>，在逃跑过程</a:t>
+            </a:r>
+            <a:r>
+              <a:rPr lang="zh-CN" altLang="zh-CN" sz="1100" dirty="0" smtClean="0">
+                <a:latin typeface="Arial Unicode MS" charset="0"/>
+                <a:ea typeface="Courier New" charset="0"/>
+              </a:rPr>
+              <a:t>中</a:t>
+            </a:r>
+            <a:r>
+              <a:rPr lang="en-US" altLang="zh-CN" sz="1100" dirty="0" smtClean="0">
+                <a:latin typeface="Arial Unicode MS" charset="0"/>
+                <a:ea typeface="Courier New" charset="0"/>
+              </a:rPr>
+              <a:t>AA</a:t>
+            </a:r>
+            <a:r>
+              <a:rPr lang="zh-CN" altLang="zh-CN" sz="1100" dirty="0" smtClean="0">
+                <a:latin typeface="Arial Unicode MS" charset="0"/>
+                <a:ea typeface="Courier New" charset="0"/>
+              </a:rPr>
+              <a:t>为</a:t>
+            </a:r>
+            <a:r>
+              <a:rPr lang="zh-CN" altLang="zh-CN" sz="1100" dirty="0">
+                <a:latin typeface="Arial Unicode MS" charset="0"/>
+                <a:ea typeface="Courier New" charset="0"/>
+              </a:rPr>
+              <a:t>抗拒抓捕持刀</a:t>
+            </a:r>
+            <a:r>
+              <a:rPr lang="zh-CN" altLang="zh-CN" sz="1100" dirty="0">
+                <a:latin typeface="Arial Unicode MS" charset="0"/>
+                <a:ea typeface="Courier New" charset="0"/>
+              </a:rPr>
+              <a:t>将</a:t>
+            </a:r>
+            <a:r>
+              <a:rPr lang="en-US" altLang="zh-CN" sz="1100" dirty="0" smtClean="0">
+                <a:latin typeface="Arial Unicode MS" charset="0"/>
+                <a:ea typeface="Courier New" charset="0"/>
+              </a:rPr>
+              <a:t>BB</a:t>
+            </a:r>
+            <a:r>
+              <a:rPr lang="zh-CN" altLang="zh-CN" sz="1100" dirty="0" smtClean="0">
+                <a:latin typeface="Arial Unicode MS" charset="0"/>
+                <a:ea typeface="Courier New" charset="0"/>
+              </a:rPr>
+              <a:t>致伤</a:t>
+            </a:r>
+            <a:r>
+              <a:rPr lang="zh-CN" altLang="zh-CN" sz="1100" dirty="0">
+                <a:latin typeface="Courier New" charset="0"/>
+                <a:ea typeface="Courier New" charset="0"/>
+              </a:rPr>
+              <a:t>。……</a:t>
+            </a:r>
+            <a:r>
+              <a:rPr lang="zh-CN" altLang="zh-CN" sz="1100" dirty="0"/>
+              <a:t> </a:t>
+            </a:r>
+          </a:p>
+        </p:txBody>
+      </p:sp>
+      <p:sp>
+        <p:nvSpPr>
+          <p:cNvPr id="18" name="文本框 17"/>
+          <p:cNvSpPr txBox="1"/>
+          <p:nvPr/>
+        </p:nvSpPr>
+        <p:spPr>
+          <a:xfrm>
+            <a:off x="3527153" y="620799"/>
+            <a:ext cx="3975440" cy="430887"/>
+          </a:xfrm>
+          <a:prstGeom prst="rect">
+            <a:avLst/>
+          </a:prstGeom>
+          <a:noFill/>
+        </p:spPr>
+        <p:txBody>
+          <a:bodyPr wrap="square" rtlCol="0">
+            <a:spAutoFit/>
+          </a:bodyPr>
+          <a:lstStyle/>
+          <a:p>
+            <a:pPr lvl="0"/>
+            <a:r>
+              <a:rPr lang="zh-CN" altLang="zh-CN" sz="1100" dirty="0">
+                <a:latin typeface="Arial Unicode MS" charset="0"/>
+                <a:ea typeface="Courier New" charset="0"/>
+              </a:rPr>
+              <a:t>尉氏县人民检察院指控</a:t>
+            </a:r>
+            <a:r>
+              <a:rPr lang="zh-CN" altLang="zh-CN" sz="1100" dirty="0" smtClean="0">
+                <a:latin typeface="Arial Unicode MS" charset="0"/>
+                <a:ea typeface="Courier New" charset="0"/>
+              </a:rPr>
+              <a:t>被告人</a:t>
+            </a:r>
+            <a:r>
+              <a:rPr lang="en-US" altLang="zh-CN" sz="1100" dirty="0" smtClean="0">
+                <a:latin typeface="Arial Unicode MS" charset="0"/>
+                <a:ea typeface="Courier New" charset="0"/>
+              </a:rPr>
+              <a:t>AA</a:t>
+            </a:r>
+            <a:r>
+              <a:rPr lang="zh-CN" altLang="zh-CN" sz="1100" dirty="0" smtClean="0">
+                <a:latin typeface="Arial Unicode MS" charset="0"/>
+                <a:ea typeface="Courier New" charset="0"/>
+              </a:rPr>
+              <a:t>犯抢</a:t>
+            </a:r>
+            <a:r>
+              <a:rPr lang="zh-CN" altLang="zh-CN" sz="1100" dirty="0">
+                <a:latin typeface="Arial Unicode MS" charset="0"/>
+                <a:ea typeface="Courier New" charset="0"/>
+              </a:rPr>
+              <a:t>劫罪，于2011年11月16日向本院提起公诉，</a:t>
+            </a:r>
+            <a:r>
+              <a:rPr lang="zh-CN" altLang="zh-CN" sz="1100" dirty="0">
+                <a:latin typeface="Arial Unicode MS" charset="0"/>
+                <a:ea typeface="Courier New" charset="0"/>
+              </a:rPr>
+              <a:t>… </a:t>
+            </a:r>
+            <a:r>
+              <a:rPr lang="zh-CN" altLang="zh-CN" sz="1100" dirty="0">
+                <a:latin typeface="Arial Unicode MS" charset="0"/>
+                <a:ea typeface="Courier New" charset="0"/>
+              </a:rPr>
+              <a:t>现已审理终结。</a:t>
+            </a:r>
+            <a:r>
+              <a:rPr lang="zh-CN" altLang="zh-CN" sz="1100" dirty="0"/>
+              <a:t> </a:t>
+            </a:r>
+          </a:p>
+        </p:txBody>
+      </p:sp>
+      <p:sp>
+        <p:nvSpPr>
+          <p:cNvPr id="21" name="文本框 20"/>
+          <p:cNvSpPr txBox="1"/>
+          <p:nvPr/>
+        </p:nvSpPr>
+        <p:spPr>
+          <a:xfrm>
+            <a:off x="3527153" y="2610600"/>
+            <a:ext cx="3742022" cy="430887"/>
+          </a:xfrm>
+          <a:prstGeom prst="rect">
+            <a:avLst/>
+          </a:prstGeom>
+          <a:noFill/>
+        </p:spPr>
+        <p:txBody>
+          <a:bodyPr wrap="square" rtlCol="0">
+            <a:spAutoFit/>
+          </a:bodyPr>
+          <a:lstStyle/>
+          <a:p>
+            <a:r>
+              <a:rPr lang="zh-CN" altLang="en-US" sz="1100" dirty="0" smtClean="0">
+                <a:latin typeface="Arial Unicode MS" charset="0"/>
+                <a:ea typeface="Courier New" charset="0"/>
+              </a:rPr>
+              <a:t>被告人</a:t>
+            </a:r>
+            <a:r>
+              <a:rPr lang="en-US" altLang="zh-CN" sz="1100" dirty="0" smtClean="0">
+                <a:latin typeface="Arial Unicode MS" charset="0"/>
+                <a:ea typeface="Courier New" charset="0"/>
+              </a:rPr>
+              <a:t>AA</a:t>
+            </a:r>
+            <a:r>
+              <a:rPr lang="zh-CN" altLang="en-US" sz="1100" dirty="0" smtClean="0">
+                <a:latin typeface="Arial Unicode MS" charset="0"/>
+                <a:ea typeface="Courier New" charset="0"/>
+              </a:rPr>
+              <a:t>犯</a:t>
+            </a:r>
+            <a:r>
+              <a:rPr lang="zh-CN" altLang="en-US" sz="1100" b="1" dirty="0" smtClean="0">
+                <a:solidFill>
+                  <a:srgbClr val="C00000"/>
+                </a:solidFill>
+                <a:latin typeface="Arial Unicode MS" charset="0"/>
+                <a:ea typeface="Courier New" charset="0"/>
+              </a:rPr>
+              <a:t>抢</a:t>
+            </a:r>
+            <a:r>
+              <a:rPr lang="zh-CN" altLang="en-US" sz="1100" b="1" dirty="0">
+                <a:solidFill>
+                  <a:srgbClr val="C00000"/>
+                </a:solidFill>
+                <a:latin typeface="Arial Unicode MS" charset="0"/>
+                <a:ea typeface="Courier New" charset="0"/>
+              </a:rPr>
+              <a:t>劫罪</a:t>
+            </a:r>
+            <a:r>
+              <a:rPr lang="zh-CN" altLang="en-US" sz="1100" dirty="0">
+                <a:latin typeface="Arial Unicode MS" charset="0"/>
+                <a:ea typeface="Courier New" charset="0"/>
+              </a:rPr>
+              <a:t>，判处有期徒三年，并处罚金人民币一千元</a:t>
+            </a:r>
+            <a:r>
+              <a:rPr lang="zh-CN" altLang="en-US" sz="1100" dirty="0">
+                <a:latin typeface="Arial Unicode MS" charset="0"/>
+                <a:ea typeface="Courier New" charset="0"/>
+              </a:rPr>
+              <a:t>。</a:t>
+            </a:r>
+            <a:r>
+              <a:rPr lang="is-IS" altLang="zh-CN" sz="1100" dirty="0">
+                <a:latin typeface="Arial Unicode MS" charset="0"/>
+                <a:ea typeface="Courier New" charset="0"/>
+              </a:rPr>
+              <a:t>…</a:t>
+            </a:r>
+            <a:endParaRPr lang="zh-CN" altLang="en-US" sz="1100" dirty="0">
+              <a:latin typeface="Arial Unicode MS" charset="0"/>
+              <a:ea typeface="Courier New" charset="0"/>
+            </a:endParaRPr>
+          </a:p>
+        </p:txBody>
+      </p:sp>
+      <p:sp>
+        <p:nvSpPr>
+          <p:cNvPr id="22" name="文本框 21"/>
+          <p:cNvSpPr txBox="1"/>
+          <p:nvPr/>
+        </p:nvSpPr>
+        <p:spPr>
+          <a:xfrm>
+            <a:off x="7629215" y="2573043"/>
+            <a:ext cx="4464496" cy="415498"/>
+          </a:xfrm>
+          <a:prstGeom prst="rect">
+            <a:avLst/>
+          </a:prstGeom>
+          <a:noFill/>
+        </p:spPr>
+        <p:txBody>
+          <a:bodyPr wrap="square" rtlCol="0">
+            <a:spAutoFit/>
+          </a:bodyPr>
+          <a:lstStyle/>
+          <a:p>
+            <a:r>
+              <a:rPr kumimoji="1" lang="en-US" altLang="zh-CN" sz="1050" dirty="0" smtClean="0"/>
+              <a:t>AA </a:t>
+            </a:r>
+            <a:r>
+              <a:rPr kumimoji="1" lang="en-US" altLang="zh-CN" sz="1050" dirty="0"/>
+              <a:t>committed the crime of </a:t>
+            </a:r>
+            <a:r>
+              <a:rPr kumimoji="1" lang="en-US" altLang="zh-CN" sz="1050" b="1" dirty="0">
+                <a:solidFill>
+                  <a:srgbClr val="C00000"/>
+                </a:solidFill>
+              </a:rPr>
+              <a:t>robbery</a:t>
+            </a:r>
+            <a:r>
+              <a:rPr kumimoji="1" lang="en-US" altLang="zh-CN" sz="1050" dirty="0"/>
+              <a:t>, and shall be </a:t>
+            </a:r>
+            <a:r>
+              <a:rPr kumimoji="1" lang="en-US" altLang="zh-CN" sz="1050" dirty="0"/>
+              <a:t>sentenced to </a:t>
+            </a:r>
+            <a:r>
+              <a:rPr kumimoji="1" lang="en-US" altLang="zh-CN" sz="1050" dirty="0"/>
+              <a:t>a </a:t>
+            </a:r>
+            <a:r>
+              <a:rPr kumimoji="1" lang="en-US" altLang="zh-CN" sz="1050" dirty="0"/>
+              <a:t>fixed-term imprisonment of 3 years and a fine of 1000 yuan</a:t>
+            </a:r>
+            <a:r>
+              <a:rPr kumimoji="1" lang="en-US" altLang="zh-CN" sz="1050" dirty="0"/>
+              <a:t>.</a:t>
+            </a:r>
+            <a:r>
+              <a:rPr kumimoji="1" lang="zh-CN" altLang="en-US" sz="1050" dirty="0"/>
+              <a:t> </a:t>
+            </a:r>
+            <a:r>
+              <a:rPr kumimoji="1" lang="is-IS" altLang="zh-CN" sz="1050" dirty="0"/>
+              <a:t>…</a:t>
+            </a:r>
+            <a:endParaRPr kumimoji="1" lang="zh-CN" altLang="en-US" sz="1050" dirty="0"/>
+          </a:p>
+        </p:txBody>
+      </p:sp>
+      <p:sp>
+        <p:nvSpPr>
+          <p:cNvPr id="25" name="文本框 24"/>
+          <p:cNvSpPr txBox="1"/>
+          <p:nvPr/>
+        </p:nvSpPr>
+        <p:spPr>
+          <a:xfrm>
+            <a:off x="12237727" y="659160"/>
+            <a:ext cx="1010213" cy="292388"/>
+          </a:xfrm>
+          <a:prstGeom prst="rect">
+            <a:avLst/>
+          </a:prstGeom>
+          <a:noFill/>
+        </p:spPr>
+        <p:txBody>
+          <a:bodyPr wrap="none" rtlCol="0">
+            <a:spAutoFit/>
+          </a:bodyPr>
+          <a:lstStyle/>
+          <a:p>
+            <a:r>
+              <a:rPr kumimoji="1" lang="en-US" altLang="zh-CN" sz="1300" b="1" dirty="0"/>
+              <a:t>Procedure</a:t>
+            </a:r>
+            <a:endParaRPr kumimoji="1" lang="zh-CN" altLang="en-US" sz="1300" b="1" dirty="0"/>
+          </a:p>
+        </p:txBody>
+      </p:sp>
+      <p:sp>
+        <p:nvSpPr>
+          <p:cNvPr id="26" name="文本框 25"/>
+          <p:cNvSpPr txBox="1"/>
+          <p:nvPr/>
+        </p:nvSpPr>
+        <p:spPr>
+          <a:xfrm>
+            <a:off x="12401429" y="1196752"/>
+            <a:ext cx="622286" cy="292388"/>
+          </a:xfrm>
+          <a:prstGeom prst="rect">
+            <a:avLst/>
+          </a:prstGeom>
+          <a:noFill/>
+        </p:spPr>
+        <p:txBody>
+          <a:bodyPr wrap="none" rtlCol="0">
+            <a:spAutoFit/>
+          </a:bodyPr>
+          <a:lstStyle/>
+          <a:p>
+            <a:r>
+              <a:rPr kumimoji="1" lang="en-US" altLang="zh-CN" sz="1300" b="1" dirty="0"/>
+              <a:t>Facts</a:t>
+            </a:r>
+            <a:endParaRPr kumimoji="1" lang="zh-CN" altLang="en-US" sz="1300" b="1" dirty="0"/>
+          </a:p>
+        </p:txBody>
+      </p:sp>
+      <p:sp>
+        <p:nvSpPr>
+          <p:cNvPr id="27" name="文本框 26"/>
+          <p:cNvSpPr txBox="1"/>
+          <p:nvPr/>
+        </p:nvSpPr>
+        <p:spPr>
+          <a:xfrm>
+            <a:off x="12237727" y="1916832"/>
+            <a:ext cx="1053686" cy="292388"/>
+          </a:xfrm>
+          <a:prstGeom prst="rect">
+            <a:avLst/>
+          </a:prstGeom>
+          <a:noFill/>
+        </p:spPr>
+        <p:txBody>
+          <a:bodyPr wrap="none" rtlCol="0">
+            <a:spAutoFit/>
+          </a:bodyPr>
+          <a:lstStyle/>
+          <a:p>
+            <a:r>
+              <a:rPr kumimoji="1" lang="en-US" altLang="zh-CN" sz="1300" b="1" dirty="0"/>
+              <a:t>Court View</a:t>
+            </a:r>
+            <a:endParaRPr kumimoji="1" lang="zh-CN" altLang="en-US" sz="1300" b="1" dirty="0"/>
+          </a:p>
+        </p:txBody>
+      </p:sp>
+      <p:sp>
+        <p:nvSpPr>
+          <p:cNvPr id="28" name="文本框 27"/>
+          <p:cNvSpPr txBox="1"/>
+          <p:nvPr/>
+        </p:nvSpPr>
+        <p:spPr>
+          <a:xfrm>
+            <a:off x="12300340" y="2564904"/>
+            <a:ext cx="928459" cy="292388"/>
+          </a:xfrm>
+          <a:prstGeom prst="rect">
+            <a:avLst/>
+          </a:prstGeom>
+          <a:noFill/>
+        </p:spPr>
+        <p:txBody>
+          <a:bodyPr wrap="none" rtlCol="0">
+            <a:spAutoFit/>
+          </a:bodyPr>
+          <a:lstStyle/>
+          <a:p>
+            <a:r>
+              <a:rPr kumimoji="1" lang="en-US" altLang="zh-CN" sz="1300" b="1" dirty="0"/>
+              <a:t>Sentence</a:t>
+            </a:r>
+            <a:endParaRPr kumimoji="1" lang="zh-CN" altLang="en-US" sz="1300" b="1" dirty="0"/>
+          </a:p>
+        </p:txBody>
+      </p:sp>
+    </p:spTree>
+    <p:extLst>
+      <p:ext uri="{BB962C8B-B14F-4D97-AF65-F5344CB8AC3E}">
+        <p14:creationId xmlns:p14="http://schemas.microsoft.com/office/powerpoint/2010/main" val="1411154259"/>
       </p:ext>
     </p:extLst>
   </p:cSld>

</xml_diff>

<commit_message>
major in related work, data, minor in intro and approach
</commit_message>
<xml_diff>
--- a/figures/pic_raw.pptx
+++ b/figures/pic_raw.pptx
@@ -268,7 +268,7 @@
               <a:pPr>
                 <a:defRPr/>
               </a:pPr>
-              <a:t>2/8/17</a:t>
+              <a:t>2/15/17</a:t>
             </a:fld>
             <a:endParaRPr lang="en-US"/>
           </a:p>
@@ -1739,7 +1739,7 @@
             </a:pPr>
             <a:fld id="{96A9556C-2595-4E56-A717-316D8EFEAEE5}" type="datetime1">
               <a:rPr lang="en-US" smtClean="0"/>
-              <a:t>2/8/17</a:t>
+              <a:t>2/15/17</a:t>
             </a:fld>
             <a:endParaRPr lang="en-US"/>
           </a:p>
@@ -1941,7 +1941,7 @@
             </a:pPr>
             <a:fld id="{30C90A5D-7968-4289-B148-46667062E381}" type="datetime1">
               <a:rPr lang="en-US" smtClean="0"/>
-              <a:t>2/8/17</a:t>
+              <a:t>2/15/17</a:t>
             </a:fld>
             <a:endParaRPr lang="en-US"/>
           </a:p>
@@ -2822,7 +2822,7 @@
             </a:pPr>
             <a:fld id="{86A90982-9BD1-41A4-898E-2DE3EFDAD62B}" type="datetime1">
               <a:rPr lang="en-US" smtClean="0"/>
-              <a:t>2/8/17</a:t>
+              <a:t>2/15/17</a:t>
             </a:fld>
             <a:endParaRPr lang="en-US"/>
           </a:p>
@@ -5601,7 +5601,7 @@
             </a:pPr>
             <a:fld id="{F317659C-7A1E-4BA8-A357-D19EE208B1A5}" type="datetime1">
               <a:rPr lang="en-US" smtClean="0"/>
-              <a:t>2/8/17</a:t>
+              <a:t>2/15/17</a:t>
             </a:fld>
             <a:endParaRPr lang="en-US"/>
           </a:p>
@@ -5883,7 +5883,7 @@
             </a:pPr>
             <a:fld id="{D0D64503-3AD9-4F80-9E80-DDFEFC8BB6B0}" type="datetime1">
               <a:rPr lang="en-US" smtClean="0"/>
-              <a:t>2/8/17</a:t>
+              <a:t>2/15/17</a:t>
             </a:fld>
             <a:endParaRPr lang="en-US"/>
           </a:p>
@@ -6141,7 +6141,7 @@
             </a:pPr>
             <a:fld id="{5C3D0017-6054-459D-AE5C-191A18401D8C}" type="datetime1">
               <a:rPr lang="en-US" smtClean="0"/>
-              <a:t>2/8/17</a:t>
+              <a:t>2/15/17</a:t>
             </a:fld>
             <a:endParaRPr lang="en-US"/>
           </a:p>
@@ -6732,27 +6732,7 @@
           <a:p>
             <a:r>
               <a:rPr lang="en-US" altLang="zh-CN" sz="1200" dirty="0"/>
-              <a:t>The People’s Procuratorate of Weishi</a:t>
-            </a:r>
-            <a:r>
-              <a:rPr lang="en-US" altLang="zh-CN" sz="1200" dirty="0"/>
-              <a:t> County </a:t>
-            </a:r>
-            <a:r>
-              <a:rPr lang="en-US" altLang="zh-CN" sz="1200" dirty="0"/>
-              <a:t>prosecuted the </a:t>
-            </a:r>
-            <a:r>
-              <a:rPr lang="en-US" altLang="zh-CN" sz="1200" dirty="0"/>
-              <a:t>defendant Jinfu Liu </a:t>
-            </a:r>
-            <a:r>
-              <a:rPr lang="en-US" altLang="zh-CN" sz="1200" dirty="0"/>
-              <a:t>for </a:t>
-            </a:r>
-            <a:r>
-              <a:rPr lang="en-US" altLang="zh-CN" sz="1200" dirty="0"/>
-              <a:t>robbery on November 16</a:t>
+              <a:t>The People’s Procuratorate of Weishi County prosecuted the defendant Jinfu Liu for robbery on November 16</a:t>
             </a:r>
             <a:r>
               <a:rPr lang="en-US" altLang="zh-CN" sz="1200" baseline="30000" dirty="0"/>
@@ -6760,11 +6740,7 @@
             </a:r>
             <a:r>
               <a:rPr lang="en-US" altLang="zh-CN" sz="1200" dirty="0"/>
-              <a:t>, 2011. </a:t>
-            </a:r>
-            <a:r>
-              <a:rPr lang="en-US" altLang="zh-CN" sz="1200" dirty="0"/>
-              <a:t>…… The case is decided now.</a:t>
+              <a:t>, 2011. …… The case is decided now.</a:t>
             </a:r>
             <a:endParaRPr lang="zh-CN" altLang="zh-CN" sz="1200" dirty="0"/>
           </a:p>
@@ -6800,49 +6776,19 @@
               <a:rPr lang="en-US" altLang="zh-CN" sz="1200" dirty="0">
                 <a:ea typeface="Arial" charset="0"/>
               </a:rPr>
-              <a:t>After hearing, </a:t>
+              <a:t>After hearing, our court identified that the defendant Jinfu Liu got spotted by the victim XX Liu when he was trying to steel the battery of an agricultural vehicle near the door of XX Liu’s house on the morning of October 6</a:t>
+            </a:r>
+            <a:r>
+              <a:rPr lang="en-US" altLang="zh-CN" sz="1200" baseline="30000" dirty="0">
+                <a:ea typeface="Arial" charset="0"/>
+              </a:rPr>
+              <a:t>th</a:t>
             </a:r>
             <a:r>
               <a:rPr lang="en-US" altLang="zh-CN" sz="1200" dirty="0">
                 <a:ea typeface="Arial" charset="0"/>
               </a:rPr>
-              <a:t>our </a:t>
-            </a:r>
-            <a:r>
-              <a:rPr lang="en-US" altLang="zh-CN" sz="1200" dirty="0">
-                <a:ea typeface="Arial" charset="0"/>
-              </a:rPr>
-              <a:t>court identified that the defendant Jinfu Liu got spotted by the victim XX Liu when he was trying to </a:t>
-            </a:r>
-            <a:r>
-              <a:rPr lang="en-US" altLang="zh-CN" sz="1200" dirty="0">
-                <a:ea typeface="Arial" charset="0"/>
-              </a:rPr>
-              <a:t>steel the </a:t>
-            </a:r>
-            <a:r>
-              <a:rPr lang="en-US" altLang="zh-CN" sz="1200" dirty="0">
-                <a:ea typeface="Arial" charset="0"/>
-              </a:rPr>
-              <a:t>battery of an agricultural vehicle near the door of XX Liu’s house on the morning of October 6</a:t>
-            </a:r>
-            <a:r>
-              <a:rPr lang="en-US" altLang="zh-CN" sz="1200" baseline="30000" dirty="0">
-                <a:ea typeface="Arial" charset="0"/>
-              </a:rPr>
-              <a:t>th</a:t>
-            </a:r>
-            <a:r>
-              <a:rPr lang="en-US" altLang="zh-CN" sz="1200" dirty="0">
-                <a:ea typeface="Arial" charset="0"/>
-              </a:rPr>
-              <a:t>, 2011. Jinfu Liu wounded XX Liu with a knife while XX Liu was trying to catch him. </a:t>
-            </a:r>
-            <a:r>
-              <a:rPr lang="en-US" altLang="zh-CN" sz="1200" dirty="0">
-                <a:ea typeface="Arial" charset="0"/>
-              </a:rPr>
-              <a:t>……</a:t>
+              <a:t>, 2011. Jinfu Liu wounded XX Liu with a knife while XX Liu was trying to catch him. ……</a:t>
             </a:r>
             <a:endParaRPr lang="zh-CN" altLang="zh-CN" sz="1200" dirty="0">
               <a:ea typeface="Arial" charset="0"/>
@@ -6880,67 +6826,31 @@
               <a:rPr lang="en-US" altLang="zh-CN" sz="1200" dirty="0">
                 <a:ea typeface="Arial" charset="0"/>
               </a:rPr>
-              <a:t>Our court </a:t>
+              <a:t>Our court hold that, the defendant Jinfu Liu caused XX Liu minor wound during theft.</a:t>
+            </a:r>
+            <a:r>
+              <a:rPr lang="zh-CN" altLang="en-US" sz="1200" dirty="0">
+                <a:ea typeface="Arial" charset="0"/>
+              </a:rPr>
+              <a:t> </a:t>
             </a:r>
             <a:r>
               <a:rPr lang="en-US" altLang="zh-CN" sz="1200" dirty="0">
                 <a:ea typeface="Arial" charset="0"/>
               </a:rPr>
-              <a:t>hold that</a:t>
+              <a:t>His</a:t>
+            </a:r>
+            <a:r>
+              <a:rPr lang="zh-CN" altLang="en-US" sz="1200" dirty="0">
+                <a:ea typeface="Arial" charset="0"/>
+              </a:rPr>
+              <a:t> </a:t>
             </a:r>
             <a:r>
               <a:rPr lang="en-US" altLang="zh-CN" sz="1200" dirty="0">
                 <a:ea typeface="Arial" charset="0"/>
               </a:rPr>
-              <a:t>, the defendant Jinfu Liu caused XX Liu minor wound during </a:t>
-            </a:r>
-            <a:r>
-              <a:rPr lang="en-US" altLang="zh-CN" sz="1200" dirty="0">
-                <a:ea typeface="Arial" charset="0"/>
-              </a:rPr>
-              <a:t>theft.</a:t>
-            </a:r>
-            <a:r>
-              <a:rPr lang="zh-CN" altLang="en-US" sz="1200" dirty="0">
-                <a:ea typeface="Arial" charset="0"/>
-              </a:rPr>
-              <a:t> </a:t>
-            </a:r>
-            <a:r>
-              <a:rPr lang="en-US" altLang="zh-CN" sz="1200" dirty="0">
-                <a:ea typeface="Arial" charset="0"/>
-              </a:rPr>
-              <a:t>His</a:t>
-            </a:r>
-            <a:r>
-              <a:rPr lang="zh-CN" altLang="en-US" sz="1200" dirty="0">
-                <a:ea typeface="Arial" charset="0"/>
-              </a:rPr>
-              <a:t> </a:t>
-            </a:r>
-            <a:r>
-              <a:rPr lang="en-US" altLang="zh-CN" sz="1200" dirty="0">
-                <a:ea typeface="Arial" charset="0"/>
-              </a:rPr>
-              <a:t>acts </a:t>
-            </a:r>
-            <a:r>
-              <a:rPr lang="en-US" altLang="zh-CN" sz="1200" dirty="0">
-                <a:ea typeface="Arial" charset="0"/>
-              </a:rPr>
-              <a:t>constituted the crime of robbery. …… According to the Article 263, Article 269, and the 3rd paragraph of Article 67 of the Criminal Law of the People’s Republic of China, the </a:t>
-            </a:r>
-            <a:r>
-              <a:rPr lang="en-US" altLang="zh-CN" sz="1200" dirty="0">
-                <a:ea typeface="Arial" charset="0"/>
-              </a:rPr>
-              <a:t>sentence is </a:t>
-            </a:r>
-            <a:r>
-              <a:rPr lang="en-US" altLang="zh-CN" sz="1200" dirty="0">
-                <a:ea typeface="Arial" charset="0"/>
-              </a:rPr>
-              <a:t>as follows:</a:t>
+              <a:t>acts constituted the crime of robbery. …… According to the Article 263, Article 269, and the 3rd paragraph of Article 67 of the Criminal Law of the People’s Republic of China, the sentence is as follows:</a:t>
             </a:r>
             <a:endParaRPr lang="zh-CN" altLang="zh-CN" sz="1200" dirty="0">
               <a:ea typeface="Arial" charset="0"/>
@@ -7135,31 +7045,7 @@
           <a:p>
             <a:r>
               <a:rPr kumimoji="1" lang="en-US" altLang="zh-CN" sz="1200" dirty="0"/>
-              <a:t>Jinfu </a:t>
-            </a:r>
-            <a:r>
-              <a:rPr kumimoji="1" lang="en-US" altLang="zh-CN" sz="1200" dirty="0"/>
-              <a:t>Liu </a:t>
-            </a:r>
-            <a:r>
-              <a:rPr kumimoji="1" lang="en-US" altLang="zh-CN" sz="1200" dirty="0"/>
-              <a:t>committed the crime of robbery, and shall be </a:t>
-            </a:r>
-            <a:r>
-              <a:rPr kumimoji="1" lang="en-US" altLang="zh-CN" sz="1200" dirty="0"/>
-              <a:t>sentenced to </a:t>
-            </a:r>
-            <a:r>
-              <a:rPr kumimoji="1" lang="en-US" altLang="zh-CN" sz="1200" dirty="0"/>
-              <a:t>a </a:t>
-            </a:r>
-            <a:r>
-              <a:rPr kumimoji="1" lang="en-US" altLang="zh-CN" sz="1200" dirty="0"/>
-              <a:t>fixed-term imprisonment of 3 years and a fine of 1000 yuan. </a:t>
-            </a:r>
-            <a:r>
-              <a:rPr kumimoji="1" lang="en-US" altLang="zh-CN" sz="1200" dirty="0"/>
-              <a:t>(A term of fixed-term imprisonment shall be counted from the date the judgment begins to be executed……)</a:t>
+              <a:t>Jinfu Liu committed the crime of robbery, and shall be sentenced to a fixed-term imprisonment of 3 years and a fine of 1000 yuan. (A term of fixed-term imprisonment shall be counted from the date the judgment begins to be executed……)</a:t>
             </a:r>
             <a:endParaRPr kumimoji="1" lang="zh-CN" altLang="en-US" sz="1200" dirty="0"/>
           </a:p>
@@ -7378,27 +7264,7 @@
           <a:p>
             <a:r>
               <a:rPr lang="en-US" altLang="zh-CN" sz="1050" dirty="0"/>
-              <a:t>The People’s Procuratorate of Weishi</a:t>
-            </a:r>
-            <a:r>
-              <a:rPr lang="en-US" altLang="zh-CN" sz="1050" dirty="0"/>
-              <a:t> County </a:t>
-            </a:r>
-            <a:r>
-              <a:rPr lang="en-US" altLang="zh-CN" sz="1050" dirty="0"/>
-              <a:t>prosecuted the </a:t>
-            </a:r>
-            <a:r>
-              <a:rPr lang="en-US" altLang="zh-CN" sz="1050" dirty="0"/>
-              <a:t>defendant Jinfu Liu </a:t>
-            </a:r>
-            <a:r>
-              <a:rPr lang="en-US" altLang="zh-CN" sz="1050" dirty="0"/>
-              <a:t>for </a:t>
-            </a:r>
-            <a:r>
-              <a:rPr lang="en-US" altLang="zh-CN" sz="1050" dirty="0"/>
-              <a:t>robbery on November 16</a:t>
+              <a:t>The People’s Procuratorate of Weishi County prosecuted the defendant Jinfu Liu for robbery on November 16</a:t>
             </a:r>
             <a:r>
               <a:rPr lang="en-US" altLang="zh-CN" sz="1050" baseline="30000" dirty="0"/>
@@ -7406,15 +7272,7 @@
             </a:r>
             <a:r>
               <a:rPr lang="en-US" altLang="zh-CN" sz="1050" dirty="0"/>
-              <a:t>, 2011. </a:t>
-            </a:r>
-            <a:r>
-              <a:rPr lang="en-US" altLang="zh-CN" sz="1050" dirty="0"/>
-              <a:t>… </a:t>
-            </a:r>
-            <a:r>
-              <a:rPr lang="en-US" altLang="zh-CN" sz="1050" dirty="0"/>
-              <a:t>The case is decided now.</a:t>
+              <a:t>, 2011. … The case is decided now.</a:t>
             </a:r>
             <a:endParaRPr lang="zh-CN" altLang="zh-CN" sz="1050" dirty="0"/>
           </a:p>
@@ -7450,61 +7308,19 @@
               <a:rPr lang="en-US" altLang="zh-CN" sz="1050" dirty="0">
                 <a:ea typeface="Arial" charset="0"/>
               </a:rPr>
-              <a:t>After hearing, </a:t>
+              <a:t>After hearing, our court identified that the defendant Jinfu Liu got spotted by the victim XX Liu when he was trying to steel the battery of an agricultural vehicle on the morning of October 6</a:t>
+            </a:r>
+            <a:r>
+              <a:rPr lang="en-US" altLang="zh-CN" sz="1050" baseline="30000" dirty="0">
+                <a:ea typeface="Arial" charset="0"/>
+              </a:rPr>
+              <a:t>th</a:t>
             </a:r>
             <a:r>
               <a:rPr lang="en-US" altLang="zh-CN" sz="1050" dirty="0">
                 <a:ea typeface="Arial" charset="0"/>
               </a:rPr>
-              <a:t>our </a:t>
-            </a:r>
-            <a:r>
-              <a:rPr lang="en-US" altLang="zh-CN" sz="1050" dirty="0">
-                <a:ea typeface="Arial" charset="0"/>
-              </a:rPr>
-              <a:t>court identified that the defendant Jinfu Liu got spotted by the victim XX Liu when he was trying to </a:t>
-            </a:r>
-            <a:r>
-              <a:rPr lang="en-US" altLang="zh-CN" sz="1050" dirty="0">
-                <a:ea typeface="Arial" charset="0"/>
-              </a:rPr>
-              <a:t>steel the </a:t>
-            </a:r>
-            <a:r>
-              <a:rPr lang="en-US" altLang="zh-CN" sz="1050" dirty="0">
-                <a:ea typeface="Arial" charset="0"/>
-              </a:rPr>
-              <a:t>battery of an agricultural vehicle </a:t>
-            </a:r>
-            <a:r>
-              <a:rPr lang="en-US" altLang="zh-CN" sz="1050" dirty="0">
-                <a:ea typeface="Arial" charset="0"/>
-              </a:rPr>
-              <a:t>on </a:t>
-            </a:r>
-            <a:r>
-              <a:rPr lang="en-US" altLang="zh-CN" sz="1050" dirty="0">
-                <a:ea typeface="Arial" charset="0"/>
-              </a:rPr>
-              <a:t>the morning of October 6</a:t>
-            </a:r>
-            <a:r>
-              <a:rPr lang="en-US" altLang="zh-CN" sz="1050" baseline="30000" dirty="0">
-                <a:ea typeface="Arial" charset="0"/>
-              </a:rPr>
-              <a:t>th</a:t>
-            </a:r>
-            <a:r>
-              <a:rPr lang="en-US" altLang="zh-CN" sz="1050" dirty="0">
-                <a:ea typeface="Arial" charset="0"/>
-              </a:rPr>
-              <a:t>, 2011. Jinfu Liu wounded XX Liu with a knife while XX Liu was trying to catch him. </a:t>
-            </a:r>
-            <a:r>
-              <a:rPr lang="en-US" altLang="zh-CN" sz="1050" dirty="0">
-                <a:ea typeface="Arial" charset="0"/>
-              </a:rPr>
-              <a:t>……</a:t>
+              <a:t>, 2011. Jinfu Liu wounded XX Liu with a knife while XX Liu was trying to catch him. ……</a:t>
             </a:r>
             <a:endParaRPr lang="zh-CN" altLang="zh-CN" sz="1050" dirty="0">
               <a:ea typeface="Arial" charset="0"/>
@@ -7542,91 +7358,49 @@
               <a:rPr lang="en-US" altLang="zh-CN" sz="1050" dirty="0">
                 <a:ea typeface="Arial" charset="0"/>
               </a:rPr>
-              <a:t>Our court </a:t>
+              <a:t>Our court hold that, the defendant Jinfu Liu caused XX Liu minor wound during theft.</a:t>
+            </a:r>
+            <a:r>
+              <a:rPr lang="zh-CN" altLang="en-US" sz="1050" dirty="0">
+                <a:ea typeface="Arial" charset="0"/>
+              </a:rPr>
+              <a:t> </a:t>
             </a:r>
             <a:r>
               <a:rPr lang="en-US" altLang="zh-CN" sz="1050" dirty="0">
                 <a:ea typeface="Arial" charset="0"/>
               </a:rPr>
-              <a:t>hold that</a:t>
+              <a:t>His</a:t>
+            </a:r>
+            <a:r>
+              <a:rPr lang="zh-CN" altLang="en-US" sz="1050" dirty="0">
+                <a:ea typeface="Arial" charset="0"/>
+              </a:rPr>
+              <a:t> </a:t>
             </a:r>
             <a:r>
               <a:rPr lang="en-US" altLang="zh-CN" sz="1050" dirty="0">
                 <a:ea typeface="Arial" charset="0"/>
               </a:rPr>
-              <a:t>, the defendant Jinfu Liu caused XX Liu minor wound during </a:t>
+              <a:t>acts constituted the crime of robbery. …… According to the Article 263, Article 269, </a:t>
+            </a:r>
+            <a:r>
+              <a:rPr lang="is-IS" altLang="zh-CN" sz="1050" dirty="0">
+                <a:ea typeface="Arial" charset="0"/>
+              </a:rPr>
+              <a:t>…</a:t>
+            </a:r>
+            <a:r>
+              <a:rPr lang="zh-CN" altLang="en-US" sz="1050" dirty="0">
+                <a:ea typeface="Arial" charset="0"/>
+              </a:rPr>
+              <a:t> </a:t>
             </a:r>
             <a:r>
               <a:rPr lang="en-US" altLang="zh-CN" sz="1050" dirty="0">
                 <a:ea typeface="Arial" charset="0"/>
               </a:rPr>
-              <a:t>theft.</a:t>
-            </a:r>
-            <a:r>
-              <a:rPr lang="zh-CN" altLang="en-US" sz="1050" dirty="0">
-                <a:ea typeface="Arial" charset="0"/>
-              </a:rPr>
-              <a:t> </a:t>
-            </a:r>
-            <a:r>
-              <a:rPr lang="en-US" altLang="zh-CN" sz="1050" dirty="0">
-                <a:ea typeface="Arial" charset="0"/>
-              </a:rPr>
-              <a:t>His</a:t>
-            </a:r>
-            <a:r>
-              <a:rPr lang="zh-CN" altLang="en-US" sz="1050" dirty="0">
-                <a:ea typeface="Arial" charset="0"/>
-              </a:rPr>
-              <a:t> </a:t>
-            </a:r>
-            <a:r>
-              <a:rPr lang="en-US" altLang="zh-CN" sz="1050" dirty="0">
-                <a:ea typeface="Arial" charset="0"/>
-              </a:rPr>
-              <a:t>acts </a:t>
-            </a:r>
-            <a:r>
-              <a:rPr lang="en-US" altLang="zh-CN" sz="1050" dirty="0">
-                <a:ea typeface="Arial" charset="0"/>
-              </a:rPr>
-              <a:t>constituted the crime of robbery. …… According to the Article 263, Article 269, </a:t>
-            </a:r>
-            <a:r>
-              <a:rPr lang="is-IS" altLang="zh-CN" sz="1050" dirty="0">
-                <a:ea typeface="Arial" charset="0"/>
-              </a:rPr>
-              <a:t>…</a:t>
-            </a:r>
-            <a:r>
-              <a:rPr lang="zh-CN" altLang="en-US" sz="1050" dirty="0">
-                <a:ea typeface="Arial" charset="0"/>
-              </a:rPr>
-              <a:t> </a:t>
-            </a:r>
-            <a:r>
-              <a:rPr lang="en-US" altLang="zh-CN" sz="1050" dirty="0">
-                <a:ea typeface="Arial" charset="0"/>
-              </a:rPr>
-              <a:t>of </a:t>
-            </a:r>
-            <a:r>
-              <a:rPr lang="en-US" altLang="zh-CN" sz="1050" dirty="0">
-                <a:ea typeface="Arial" charset="0"/>
-              </a:rPr>
-              <a:t>the Criminal Law of the People’s Republic of China, the </a:t>
-            </a:r>
-            <a:r>
-              <a:rPr lang="en-US" altLang="zh-CN" sz="1050" dirty="0">
-                <a:ea typeface="Arial" charset="0"/>
-              </a:rPr>
-              <a:t>sentence is </a:t>
-            </a:r>
-            <a:r>
-              <a:rPr lang="en-US" altLang="zh-CN" sz="1050" dirty="0">
-                <a:ea typeface="Arial" charset="0"/>
-              </a:rPr>
-              <a:t>as follows:</a:t>
+              <a:t>of the Criminal Law of the People’s Republic of China, the sentence is as follows:</a:t>
             </a:r>
             <a:endParaRPr lang="zh-CN" altLang="zh-CN" sz="1050" dirty="0">
               <a:ea typeface="Arial" charset="0"/>
@@ -7662,35 +7436,21 @@
                 <a:latin typeface="Arial Unicode MS" charset="0"/>
                 <a:ea typeface="Courier New" charset="0"/>
               </a:rPr>
-              <a:t>本院认为，被告人刘金付在盗窃过程中携带凶器，为抗拒抓捕而当场使用暴力致被害人刘XX轻微伤，其行为已构成抢劫罪，…… 依照《中华人民共和国刑法》第二百六十三条、第二百六十九条</a:t>
+              <a:t>本院认为，被告人刘金付在盗窃过程中携带凶器，为抗拒抓捕而当场使用暴力致被害人刘XX轻微伤，其行为已构成抢劫罪，…… 依照《中华人民共和国刑法》第二百六十三条、第二百六十九条、</a:t>
+            </a:r>
+            <a:r>
+              <a:rPr lang="is-IS" altLang="zh-CN" sz="1100" dirty="0">
+                <a:latin typeface="Arial Unicode MS" charset="0"/>
+                <a:ea typeface="Courier New" charset="0"/>
+              </a:rPr>
+              <a:t>…</a:t>
             </a:r>
             <a:r>
               <a:rPr lang="zh-CN" altLang="zh-CN" sz="1100" dirty="0">
                 <a:latin typeface="Arial Unicode MS" charset="0"/>
                 <a:ea typeface="Courier New" charset="0"/>
               </a:rPr>
-              <a:t>、</a:t>
-            </a:r>
-            <a:r>
-              <a:rPr lang="is-IS" altLang="zh-CN" sz="1100" dirty="0">
-                <a:latin typeface="Arial Unicode MS" charset="0"/>
-                <a:ea typeface="Courier New" charset="0"/>
-              </a:rPr>
-              <a:t>…</a:t>
-            </a:r>
-            <a:r>
-              <a:rPr lang="zh-CN" altLang="zh-CN" sz="1100" dirty="0">
-                <a:latin typeface="Arial Unicode MS" charset="0"/>
-                <a:ea typeface="Courier New" charset="0"/>
-              </a:rPr>
-              <a:t>之</a:t>
-            </a:r>
-            <a:r>
-              <a:rPr lang="zh-CN" altLang="zh-CN" sz="1100" dirty="0">
-                <a:latin typeface="Arial Unicode MS" charset="0"/>
-                <a:ea typeface="Courier New" charset="0"/>
-              </a:rPr>
-              <a:t>规定，判决如下： </a:t>
+              <a:t>之规定，判决如下： </a:t>
             </a:r>
           </a:p>
           <a:p>
@@ -7770,21 +7530,7 @@
                 <a:latin typeface="Arial Unicode MS" charset="0"/>
                 <a:ea typeface="Courier New" charset="0"/>
               </a:rPr>
-              <a:t>尉氏县人民检察院指控被告人刘金付犯抢劫罪，于2011年11月16日向本院提起公诉，</a:t>
-            </a:r>
-            <a:r>
-              <a:rPr lang="zh-CN" altLang="zh-CN" sz="1100" dirty="0">
-                <a:latin typeface="Arial Unicode MS" charset="0"/>
-                <a:ea typeface="Courier New" charset="0"/>
-              </a:rPr>
-              <a:t>… </a:t>
-            </a:r>
-            <a:r>
-              <a:rPr lang="zh-CN" altLang="zh-CN" sz="1100" dirty="0">
-                <a:latin typeface="Arial Unicode MS" charset="0"/>
-                <a:ea typeface="Courier New" charset="0"/>
-              </a:rPr>
-              <a:t>现已审理终结。</a:t>
+              <a:t>尉氏县人民检察院指控被告人刘金付犯抢劫罪，于2011年11月16日向本院提起公诉，… 现已审理终结。</a:t>
             </a:r>
             <a:r>
               <a:rPr lang="zh-CN" altLang="zh-CN" sz="1100" dirty="0"/>
@@ -7820,14 +7566,7 @@
                 <a:latin typeface="Arial Unicode MS" charset="0"/>
                 <a:ea typeface="Courier New" charset="0"/>
               </a:rPr>
-              <a:t>被告人刘金付犯抢劫罪，判处有期徒三年，并处罚金人民币一千元</a:t>
-            </a:r>
-            <a:r>
-              <a:rPr lang="zh-CN" altLang="en-US" sz="1100" dirty="0">
-                <a:latin typeface="Arial Unicode MS" charset="0"/>
-                <a:ea typeface="Courier New" charset="0"/>
-              </a:rPr>
-              <a:t>。</a:t>
+              <a:t>被告人刘金付犯抢劫罪，判处有期徒三年，并处罚金人民币一千元。</a:t>
             </a:r>
             <a:r>
               <a:rPr lang="is-IS" altLang="zh-CN" sz="1100" dirty="0">
@@ -7867,31 +7606,7 @@
           <a:p>
             <a:r>
               <a:rPr kumimoji="1" lang="en-US" altLang="zh-CN" sz="1050" dirty="0"/>
-              <a:t>Jinfu </a:t>
-            </a:r>
-            <a:r>
-              <a:rPr kumimoji="1" lang="en-US" altLang="zh-CN" sz="1050" dirty="0"/>
-              <a:t>Liu </a:t>
-            </a:r>
-            <a:r>
-              <a:rPr kumimoji="1" lang="en-US" altLang="zh-CN" sz="1050" dirty="0"/>
-              <a:t>committed the crime of robbery, and shall be </a:t>
-            </a:r>
-            <a:r>
-              <a:rPr kumimoji="1" lang="en-US" altLang="zh-CN" sz="1050" dirty="0"/>
-              <a:t>sentenced to </a:t>
-            </a:r>
-            <a:r>
-              <a:rPr kumimoji="1" lang="en-US" altLang="zh-CN" sz="1050" dirty="0"/>
-              <a:t>a </a:t>
-            </a:r>
-            <a:r>
-              <a:rPr kumimoji="1" lang="en-US" altLang="zh-CN" sz="1050" dirty="0"/>
-              <a:t>fixed-term imprisonment of 3 years and a fine of 1000 yuan</a:t>
-            </a:r>
-            <a:r>
-              <a:rPr kumimoji="1" lang="en-US" altLang="zh-CN" sz="1050" dirty="0"/>
-              <a:t>.</a:t>
+              <a:t>Jinfu Liu committed the crime of robbery, and shall be sentenced to a fixed-term imprisonment of 3 years and a fine of 1000 yuan.</a:t>
             </a:r>
             <a:r>
               <a:rPr kumimoji="1" lang="zh-CN" altLang="en-US" sz="1050" dirty="0"/>
@@ -8302,27 +8017,7 @@
           <a:p>
             <a:r>
               <a:rPr lang="en-US" altLang="zh-CN" sz="1050" dirty="0"/>
-              <a:t>The People’s Procuratorate of Weishi</a:t>
-            </a:r>
-            <a:r>
-              <a:rPr lang="en-US" altLang="zh-CN" sz="1050" dirty="0"/>
-              <a:t> County </a:t>
-            </a:r>
-            <a:r>
-              <a:rPr lang="en-US" altLang="zh-CN" sz="1050" dirty="0"/>
-              <a:t>prosecuted the </a:t>
-            </a:r>
-            <a:r>
-              <a:rPr lang="en-US" altLang="zh-CN" sz="1050" dirty="0"/>
-              <a:t>defendant Jinfu Liu </a:t>
-            </a:r>
-            <a:r>
-              <a:rPr lang="en-US" altLang="zh-CN" sz="1050" dirty="0"/>
-              <a:t>for </a:t>
-            </a:r>
-            <a:r>
-              <a:rPr lang="en-US" altLang="zh-CN" sz="1050" dirty="0"/>
-              <a:t>robbery on November 16</a:t>
+              <a:t>The People’s Procuratorate of Weishi County prosecuted the defendant Jinfu Liu for robbery on November 16</a:t>
             </a:r>
             <a:r>
               <a:rPr lang="en-US" altLang="zh-CN" sz="1050" baseline="30000" dirty="0"/>
@@ -8330,15 +8025,7 @@
             </a:r>
             <a:r>
               <a:rPr lang="en-US" altLang="zh-CN" sz="1050" dirty="0"/>
-              <a:t>, 2011. </a:t>
-            </a:r>
-            <a:r>
-              <a:rPr lang="en-US" altLang="zh-CN" sz="1050" dirty="0"/>
-              <a:t>… </a:t>
-            </a:r>
-            <a:r>
-              <a:rPr lang="en-US" altLang="zh-CN" sz="1050" dirty="0"/>
-              <a:t>The case is decided now.</a:t>
+              <a:t>, 2011. … The case is decided now.</a:t>
             </a:r>
             <a:endParaRPr lang="zh-CN" altLang="zh-CN" sz="1050" dirty="0"/>
           </a:p>
@@ -8374,61 +8061,19 @@
               <a:rPr lang="en-US" altLang="zh-CN" sz="1050" dirty="0">
                 <a:ea typeface="Arial" charset="0"/>
               </a:rPr>
-              <a:t>After hearing, </a:t>
+              <a:t>After hearing, our court identified that the defendant Jinfu Liu got spotted by the victim XX Liu when he was trying to steel the battery of an agricultural vehicle on the morning of October 6</a:t>
+            </a:r>
+            <a:r>
+              <a:rPr lang="en-US" altLang="zh-CN" sz="1050" baseline="30000" dirty="0">
+                <a:ea typeface="Arial" charset="0"/>
+              </a:rPr>
+              <a:t>th</a:t>
             </a:r>
             <a:r>
               <a:rPr lang="en-US" altLang="zh-CN" sz="1050" dirty="0">
                 <a:ea typeface="Arial" charset="0"/>
               </a:rPr>
-              <a:t>our </a:t>
-            </a:r>
-            <a:r>
-              <a:rPr lang="en-US" altLang="zh-CN" sz="1050" dirty="0">
-                <a:ea typeface="Arial" charset="0"/>
-              </a:rPr>
-              <a:t>court identified that the defendant Jinfu Liu got spotted by the victim XX Liu when he was trying to </a:t>
-            </a:r>
-            <a:r>
-              <a:rPr lang="en-US" altLang="zh-CN" sz="1050" dirty="0">
-                <a:ea typeface="Arial" charset="0"/>
-              </a:rPr>
-              <a:t>steel the </a:t>
-            </a:r>
-            <a:r>
-              <a:rPr lang="en-US" altLang="zh-CN" sz="1050" dirty="0">
-                <a:ea typeface="Arial" charset="0"/>
-              </a:rPr>
-              <a:t>battery of an agricultural vehicle </a:t>
-            </a:r>
-            <a:r>
-              <a:rPr lang="en-US" altLang="zh-CN" sz="1050" dirty="0">
-                <a:ea typeface="Arial" charset="0"/>
-              </a:rPr>
-              <a:t>on </a:t>
-            </a:r>
-            <a:r>
-              <a:rPr lang="en-US" altLang="zh-CN" sz="1050" dirty="0">
-                <a:ea typeface="Arial" charset="0"/>
-              </a:rPr>
-              <a:t>the morning of October 6</a:t>
-            </a:r>
-            <a:r>
-              <a:rPr lang="en-US" altLang="zh-CN" sz="1050" baseline="30000" dirty="0">
-                <a:ea typeface="Arial" charset="0"/>
-              </a:rPr>
-              <a:t>th</a:t>
-            </a:r>
-            <a:r>
-              <a:rPr lang="en-US" altLang="zh-CN" sz="1050" dirty="0">
-                <a:ea typeface="Arial" charset="0"/>
-              </a:rPr>
-              <a:t>, 2011. Jinfu Liu wounded XX Liu with a knife while XX Liu was trying to catch him. </a:t>
-            </a:r>
-            <a:r>
-              <a:rPr lang="en-US" altLang="zh-CN" sz="1050" dirty="0">
-                <a:ea typeface="Arial" charset="0"/>
-              </a:rPr>
-              <a:t>……</a:t>
+              <a:t>, 2011. Jinfu Liu wounded XX Liu with a knife while XX Liu was trying to catch him. ……</a:t>
             </a:r>
             <a:endParaRPr lang="zh-CN" altLang="zh-CN" sz="1050" dirty="0">
               <a:ea typeface="Arial" charset="0"/>
@@ -8637,14 +8282,7 @@
                 <a:latin typeface="Arial Unicode MS" charset="0"/>
                 <a:ea typeface="Courier New" charset="0"/>
               </a:rPr>
-              <a:t>之</a:t>
-            </a:r>
-            <a:r>
-              <a:rPr lang="zh-CN" altLang="zh-CN" sz="1100" dirty="0">
-                <a:latin typeface="Arial Unicode MS" charset="0"/>
-                <a:ea typeface="Courier New" charset="0"/>
-              </a:rPr>
-              <a:t>规定，判决如下： </a:t>
+              <a:t>之规定，判决如下： </a:t>
             </a:r>
           </a:p>
           <a:p>
@@ -8724,21 +8362,7 @@
                 <a:latin typeface="Arial Unicode MS" charset="0"/>
                 <a:ea typeface="Courier New" charset="0"/>
               </a:rPr>
-              <a:t>尉氏县人民检察院指控被告人刘金付犯抢劫罪，于2011年11月16日向本院提起公诉，</a:t>
-            </a:r>
-            <a:r>
-              <a:rPr lang="zh-CN" altLang="zh-CN" sz="1100" dirty="0">
-                <a:latin typeface="Arial Unicode MS" charset="0"/>
-                <a:ea typeface="Courier New" charset="0"/>
-              </a:rPr>
-              <a:t>… </a:t>
-            </a:r>
-            <a:r>
-              <a:rPr lang="zh-CN" altLang="zh-CN" sz="1100" dirty="0">
-                <a:latin typeface="Arial Unicode MS" charset="0"/>
-                <a:ea typeface="Courier New" charset="0"/>
-              </a:rPr>
-              <a:t>现已审理终结。</a:t>
+              <a:t>尉氏县人民检察院指控被告人刘金付犯抢劫罪，于2011年11月16日向本院提起公诉，… 现已审理终结。</a:t>
             </a:r>
             <a:r>
               <a:rPr lang="zh-CN" altLang="zh-CN" sz="1100" dirty="0"/>
@@ -8791,14 +8415,7 @@
                 <a:latin typeface="Arial Unicode MS" charset="0"/>
                 <a:ea typeface="Courier New" charset="0"/>
               </a:rPr>
-              <a:t>，判处有期徒三年，并处罚金人民币一千元</a:t>
-            </a:r>
-            <a:r>
-              <a:rPr lang="zh-CN" altLang="en-US" sz="1100" dirty="0">
-                <a:latin typeface="Arial Unicode MS" charset="0"/>
-                <a:ea typeface="Courier New" charset="0"/>
-              </a:rPr>
-              <a:t>。</a:t>
+              <a:t>，判处有期徒三年，并处罚金人民币一千元。</a:t>
             </a:r>
             <a:r>
               <a:rPr lang="is-IS" altLang="zh-CN" sz="1100" dirty="0">
@@ -8838,43 +8455,19 @@
           <a:p>
             <a:r>
               <a:rPr kumimoji="1" lang="en-US" altLang="zh-CN" sz="1050" dirty="0"/>
-              <a:t>Jinfu </a:t>
+              <a:t>Jinfu Liu committed the crime of </a:t>
+            </a:r>
+            <a:r>
+              <a:rPr kumimoji="1" lang="en-US" altLang="zh-CN" sz="1050" b="1" dirty="0">
+                <a:solidFill>
+                  <a:srgbClr val="C00000"/>
+                </a:solidFill>
+              </a:rPr>
+              <a:t>robbery</a:t>
             </a:r>
             <a:r>
               <a:rPr kumimoji="1" lang="en-US" altLang="zh-CN" sz="1050" dirty="0"/>
-              <a:t>Liu </a:t>
-            </a:r>
-            <a:r>
-              <a:rPr kumimoji="1" lang="en-US" altLang="zh-CN" sz="1050" dirty="0"/>
-              <a:t>committed the crime of </a:t>
-            </a:r>
-            <a:r>
-              <a:rPr kumimoji="1" lang="en-US" altLang="zh-CN" sz="1050" b="1" dirty="0">
-                <a:solidFill>
-                  <a:srgbClr val="C00000"/>
-                </a:solidFill>
-              </a:rPr>
-              <a:t>robbery</a:t>
-            </a:r>
-            <a:r>
-              <a:rPr kumimoji="1" lang="en-US" altLang="zh-CN" sz="1050" dirty="0"/>
-              <a:t>, and shall be </a:t>
-            </a:r>
-            <a:r>
-              <a:rPr kumimoji="1" lang="en-US" altLang="zh-CN" sz="1050" dirty="0"/>
-              <a:t>sentenced to </a:t>
-            </a:r>
-            <a:r>
-              <a:rPr kumimoji="1" lang="en-US" altLang="zh-CN" sz="1050" dirty="0"/>
-              <a:t>a </a:t>
-            </a:r>
-            <a:r>
-              <a:rPr kumimoji="1" lang="en-US" altLang="zh-CN" sz="1050" dirty="0"/>
-              <a:t>fixed-term imprisonment of 3 years and a fine of 1000 yuan</a:t>
-            </a:r>
-            <a:r>
-              <a:rPr kumimoji="1" lang="en-US" altLang="zh-CN" sz="1050" dirty="0"/>
-              <a:t>.</a:t>
+              <a:t>, and shall be sentenced to a fixed-term imprisonment of 3 years and a fine of 1000 yuan.</a:t>
             </a:r>
             <a:r>
               <a:rPr kumimoji="1" lang="zh-CN" altLang="en-US" sz="1050" dirty="0"/>
@@ -9048,7 +8641,7 @@
         </p:nvSpPr>
         <p:spPr bwMode="auto">
           <a:xfrm>
-            <a:off x="7629215" y="620688"/>
+            <a:off x="7629215" y="116632"/>
             <a:ext cx="4608512" cy="369332"/>
           </a:xfrm>
           <a:prstGeom prst="rect">
@@ -9101,19 +8694,7 @@
           <a:p>
             <a:r>
               <a:rPr lang="en-US" altLang="zh-CN" sz="1050" dirty="0"/>
-              <a:t>The People’s Procuratorate of Weishi</a:t>
-            </a:r>
-            <a:r>
-              <a:rPr lang="en-US" altLang="zh-CN" sz="1050" dirty="0"/>
-              <a:t> County </a:t>
-            </a:r>
-            <a:r>
-              <a:rPr lang="en-US" altLang="zh-CN" sz="1050" dirty="0"/>
-              <a:t>prosecuted the </a:t>
-            </a:r>
-            <a:r>
-              <a:rPr lang="en-US" altLang="zh-CN" sz="1050" dirty="0"/>
-              <a:t>defendant </a:t>
+              <a:t>The People’s Procuratorate of Weishi County prosecuted the defendant </a:t>
             </a:r>
             <a:r>
               <a:rPr lang="en-US" altLang="zh-CN" sz="1050" dirty="0" smtClean="0"/>
@@ -9121,11 +8702,7 @@
             </a:r>
             <a:r>
               <a:rPr lang="en-US" altLang="zh-CN" sz="1050" dirty="0"/>
-              <a:t>for </a:t>
-            </a:r>
-            <a:r>
-              <a:rPr lang="en-US" altLang="zh-CN" sz="1050" dirty="0"/>
-              <a:t>robbery on November 16</a:t>
+              <a:t>for robbery on November 16</a:t>
             </a:r>
             <a:r>
               <a:rPr lang="en-US" altLang="zh-CN" sz="1050" baseline="30000" dirty="0"/>
@@ -9133,15 +8710,7 @@
             </a:r>
             <a:r>
               <a:rPr lang="en-US" altLang="zh-CN" sz="1050" dirty="0"/>
-              <a:t>, 2011. </a:t>
-            </a:r>
-            <a:r>
-              <a:rPr lang="en-US" altLang="zh-CN" sz="1050" dirty="0"/>
-              <a:t>… </a:t>
-            </a:r>
-            <a:r>
-              <a:rPr lang="en-US" altLang="zh-CN" sz="1050" dirty="0"/>
-              <a:t>The case is decided now.</a:t>
+              <a:t>, 2011. … The case is decided now.</a:t>
             </a:r>
             <a:endParaRPr lang="zh-CN" altLang="zh-CN" sz="1050" dirty="0"/>
           </a:p>
@@ -9174,34 +8743,94 @@
               </a:spcAft>
             </a:pPr>
             <a:r>
+              <a:rPr lang="en-US" altLang="zh-CN" sz="1050" b="1" dirty="0">
+                <a:solidFill>
+                  <a:srgbClr val="008136"/>
+                </a:solidFill>
+                <a:ea typeface="Arial" charset="0"/>
+              </a:rPr>
+              <a:t>After hearing, our court identified </a:t>
+            </a:r>
+            <a:r>
+              <a:rPr lang="en-US" altLang="zh-CN" sz="1050" b="1" dirty="0" smtClean="0">
+                <a:solidFill>
+                  <a:srgbClr val="008136"/>
+                </a:solidFill>
+                <a:ea typeface="Arial" charset="0"/>
+              </a:rPr>
+              <a:t>that </a:t>
+            </a:r>
+            <a:r>
+              <a:rPr lang="en-US" altLang="zh-CN" sz="1050" dirty="0" smtClean="0">
+                <a:ea typeface="Arial" charset="0"/>
+              </a:rPr>
+              <a:t>the </a:t>
+            </a:r>
+            <a:r>
               <a:rPr lang="en-US" altLang="zh-CN" sz="1050" dirty="0">
                 <a:ea typeface="Arial" charset="0"/>
               </a:rPr>
-              <a:t>After hearing, </a:t>
+              <a:t>defendant </a:t>
+            </a:r>
+            <a:r>
+              <a:rPr lang="en-US" altLang="zh-CN" sz="1050" dirty="0" smtClean="0">
+                <a:ea typeface="Arial" charset="0"/>
+              </a:rPr>
+              <a:t>AA </a:t>
             </a:r>
             <a:r>
               <a:rPr lang="en-US" altLang="zh-CN" sz="1050" dirty="0">
                 <a:ea typeface="Arial" charset="0"/>
               </a:rPr>
-              <a:t>our </a:t>
+              <a:t>got spotted by the victim </a:t>
+            </a:r>
+            <a:r>
+              <a:rPr lang="en-US" altLang="zh-CN" sz="1050" dirty="0" smtClean="0">
+                <a:ea typeface="Arial" charset="0"/>
+              </a:rPr>
+              <a:t>BB </a:t>
             </a:r>
             <a:r>
               <a:rPr lang="en-US" altLang="zh-CN" sz="1050" dirty="0">
                 <a:ea typeface="Arial" charset="0"/>
               </a:rPr>
-              <a:t>court identified that the defendant </a:t>
+              <a:t>when he was trying to steel the battery of an agricultural vehicle on the morning of October 6</a:t>
+            </a:r>
+            <a:r>
+              <a:rPr lang="en-US" altLang="zh-CN" sz="1050" baseline="30000" dirty="0">
+                <a:ea typeface="Arial" charset="0"/>
+              </a:rPr>
+              <a:t>th</a:t>
+            </a:r>
+            <a:r>
+              <a:rPr lang="en-US" altLang="zh-CN" sz="1050" dirty="0">
+                <a:ea typeface="Arial" charset="0"/>
+              </a:rPr>
+              <a:t>, 2011. </a:t>
             </a:r>
             <a:r>
               <a:rPr lang="en-US" altLang="zh-CN" sz="1050" dirty="0" smtClean="0">
                 <a:ea typeface="Arial" charset="0"/>
               </a:rPr>
-              <a:t>AA </a:t>
+              <a:t>AA wounded</a:t>
+            </a:r>
+            <a:r>
+              <a:rPr lang="zh-CN" altLang="en-US" sz="1050" dirty="0" smtClean="0">
+                <a:ea typeface="Arial" charset="0"/>
+              </a:rPr>
+              <a:t> </a:t>
+            </a:r>
+            <a:r>
+              <a:rPr lang="en-US" altLang="zh-CN" sz="1050" dirty="0" smtClean="0">
+                <a:ea typeface="Arial" charset="0"/>
+              </a:rPr>
+              <a:t>BB </a:t>
             </a:r>
             <a:r>
               <a:rPr lang="en-US" altLang="zh-CN" sz="1050" dirty="0">
                 <a:ea typeface="Arial" charset="0"/>
               </a:rPr>
-              <a:t>got spotted by the victim </a:t>
+              <a:t>with a knife while </a:t>
             </a:r>
             <a:r>
               <a:rPr lang="en-US" altLang="zh-CN" sz="1050" dirty="0" smtClean="0">
@@ -9213,85 +8842,7 @@
               <a:rPr lang="en-US" altLang="zh-CN" sz="1050" dirty="0">
                 <a:ea typeface="Arial" charset="0"/>
               </a:rPr>
-              <a:t>when he was trying to </a:t>
-            </a:r>
-            <a:r>
-              <a:rPr lang="en-US" altLang="zh-CN" sz="1050" dirty="0">
-                <a:ea typeface="Arial" charset="0"/>
-              </a:rPr>
-              <a:t>steel the </a:t>
-            </a:r>
-            <a:r>
-              <a:rPr lang="en-US" altLang="zh-CN" sz="1050" dirty="0">
-                <a:ea typeface="Arial" charset="0"/>
-              </a:rPr>
-              <a:t>battery of an agricultural vehicle </a:t>
-            </a:r>
-            <a:r>
-              <a:rPr lang="en-US" altLang="zh-CN" sz="1050" dirty="0">
-                <a:ea typeface="Arial" charset="0"/>
-              </a:rPr>
-              <a:t>on </a:t>
-            </a:r>
-            <a:r>
-              <a:rPr lang="en-US" altLang="zh-CN" sz="1050" dirty="0">
-                <a:ea typeface="Arial" charset="0"/>
-              </a:rPr>
-              <a:t>the morning of October 6</a:t>
-            </a:r>
-            <a:r>
-              <a:rPr lang="en-US" altLang="zh-CN" sz="1050" baseline="30000" dirty="0">
-                <a:ea typeface="Arial" charset="0"/>
-              </a:rPr>
-              <a:t>th</a:t>
-            </a:r>
-            <a:r>
-              <a:rPr lang="en-US" altLang="zh-CN" sz="1050" dirty="0">
-                <a:ea typeface="Arial" charset="0"/>
-              </a:rPr>
-              <a:t>, 2011. </a:t>
-            </a:r>
-            <a:r>
-              <a:rPr lang="en-US" altLang="zh-CN" sz="1050" dirty="0" smtClean="0">
-                <a:ea typeface="Arial" charset="0"/>
-              </a:rPr>
-              <a:t>AA wounded</a:t>
-            </a:r>
-            <a:r>
-              <a:rPr lang="zh-CN" altLang="en-US" sz="1050" dirty="0" smtClean="0">
-                <a:ea typeface="Arial" charset="0"/>
-              </a:rPr>
-              <a:t> </a:t>
-            </a:r>
-            <a:r>
-              <a:rPr lang="en-US" altLang="zh-CN" sz="1050" dirty="0" smtClean="0">
-                <a:ea typeface="Arial" charset="0"/>
-              </a:rPr>
-              <a:t>BB </a:t>
-            </a:r>
-            <a:r>
-              <a:rPr lang="en-US" altLang="zh-CN" sz="1050" dirty="0">
-                <a:ea typeface="Arial" charset="0"/>
-              </a:rPr>
-              <a:t>with a knife while </a:t>
-            </a:r>
-            <a:r>
-              <a:rPr lang="en-US" altLang="zh-CN" sz="1050" dirty="0" smtClean="0">
-                <a:ea typeface="Arial" charset="0"/>
-              </a:rPr>
-              <a:t>BB </a:t>
-            </a:r>
-            <a:r>
-              <a:rPr lang="en-US" altLang="zh-CN" sz="1050" dirty="0">
-                <a:ea typeface="Arial" charset="0"/>
-              </a:rPr>
-              <a:t>was trying to catch him. </a:t>
-            </a:r>
-            <a:r>
-              <a:rPr lang="en-US" altLang="zh-CN" sz="1050" dirty="0">
-                <a:ea typeface="Arial" charset="0"/>
-              </a:rPr>
-              <a:t>……</a:t>
+              <a:t>was trying to catch him. ……</a:t>
             </a:r>
             <a:endParaRPr lang="zh-CN" altLang="zh-CN" sz="1050" dirty="0">
               <a:ea typeface="Arial" charset="0"/>
@@ -9326,10 +8877,19 @@
               </a:spcAft>
             </a:pPr>
             <a:r>
+              <a:rPr lang="en-US" altLang="zh-CN" sz="1050" b="1" dirty="0" smtClean="0">
+                <a:solidFill>
+                  <a:srgbClr val="008136"/>
+                </a:solidFill>
+                <a:ea typeface="Arial" charset="0"/>
+              </a:rPr>
+              <a:t>Our court hold that</a:t>
+            </a:r>
+            <a:r>
               <a:rPr lang="en-US" altLang="zh-CN" sz="1050" dirty="0" smtClean="0">
                 <a:ea typeface="Arial" charset="0"/>
               </a:rPr>
-              <a:t>Our court hold that, the defendant AA caused</a:t>
+              <a:t>, the defendant AA caused</a:t>
             </a:r>
             <a:r>
               <a:rPr lang="zh-CN" altLang="en-US" sz="1050" dirty="0" smtClean="0">
@@ -9341,13 +8901,19 @@
               <a:rPr lang="en-US" altLang="zh-CN" sz="1050" dirty="0" smtClean="0">
                 <a:ea typeface="Arial" charset="0"/>
               </a:rPr>
-              <a:t>BB minor wound </a:t>
+              <a:t>BB minor wound during</a:t>
+            </a:r>
+            <a:r>
+              <a:rPr lang="zh-CN" altLang="en-US" sz="1050" dirty="0" smtClean="0">
+                <a:ea typeface="Arial" charset="0"/>
+              </a:rPr>
+              <a:t> </a:t>
             </a:r>
             <a:r>
               <a:rPr lang="en-US" altLang="zh-CN" sz="1050" dirty="0" smtClean="0">
                 <a:ea typeface="Arial" charset="0"/>
               </a:rPr>
-              <a:t>during</a:t>
+              <a:t>the</a:t>
             </a:r>
             <a:r>
               <a:rPr lang="zh-CN" altLang="en-US" sz="1050" dirty="0" smtClean="0">
@@ -9359,7 +8925,7 @@
               <a:rPr lang="en-US" altLang="zh-CN" sz="1050" dirty="0" smtClean="0">
                 <a:ea typeface="Arial" charset="0"/>
               </a:rPr>
-              <a:t>the</a:t>
+              <a:t>process</a:t>
             </a:r>
             <a:r>
               <a:rPr lang="zh-CN" altLang="en-US" sz="1050" dirty="0" smtClean="0">
@@ -9371,7 +8937,7 @@
               <a:rPr lang="en-US" altLang="zh-CN" sz="1050" dirty="0" smtClean="0">
                 <a:ea typeface="Arial" charset="0"/>
               </a:rPr>
-              <a:t>process</a:t>
+              <a:t>of stealing.</a:t>
             </a:r>
             <a:r>
               <a:rPr lang="zh-CN" altLang="en-US" sz="1050" dirty="0" smtClean="0">
@@ -9383,13 +8949,55 @@
               <a:rPr lang="en-US" altLang="zh-CN" sz="1050" dirty="0" smtClean="0">
                 <a:ea typeface="Arial" charset="0"/>
               </a:rPr>
-              <a:t>of stealing</a:t>
+              <a:t>His</a:t>
+            </a:r>
+            <a:r>
+              <a:rPr lang="zh-CN" altLang="en-US" sz="1050" dirty="0" smtClean="0">
+                <a:ea typeface="Arial" charset="0"/>
+              </a:rPr>
+              <a:t> </a:t>
             </a:r>
             <a:r>
               <a:rPr lang="en-US" altLang="zh-CN" sz="1050" dirty="0" smtClean="0">
                 <a:ea typeface="Arial" charset="0"/>
               </a:rPr>
-              <a:t>.</a:t>
+              <a:t>acts constituted the crime of robbery. …… According to the </a:t>
+            </a:r>
+            <a:r>
+              <a:rPr lang="en-US" altLang="zh-CN" sz="1050" b="1" dirty="0" smtClean="0">
+                <a:solidFill>
+                  <a:srgbClr val="0070C0"/>
+                </a:solidFill>
+                <a:ea typeface="Arial" charset="0"/>
+              </a:rPr>
+              <a:t>Article 263</a:t>
+            </a:r>
+            <a:r>
+              <a:rPr lang="en-US" altLang="zh-CN" sz="1050" dirty="0" smtClean="0">
+                <a:ea typeface="Arial" charset="0"/>
+              </a:rPr>
+              <a:t>, </a:t>
+            </a:r>
+            <a:r>
+              <a:rPr lang="en-US" altLang="zh-CN" sz="1050" b="1" dirty="0" smtClean="0">
+                <a:solidFill>
+                  <a:srgbClr val="0070C0"/>
+                </a:solidFill>
+                <a:ea typeface="Arial" charset="0"/>
+              </a:rPr>
+              <a:t>Article 269</a:t>
+            </a:r>
+            <a:r>
+              <a:rPr lang="en-US" altLang="zh-CN" sz="1050" dirty="0" smtClean="0">
+                <a:ea typeface="Arial" charset="0"/>
+              </a:rPr>
+              <a:t>, </a:t>
+            </a:r>
+            <a:r>
+              <a:rPr lang="is-IS" altLang="zh-CN" sz="1050" dirty="0" smtClean="0">
+                <a:ea typeface="Arial" charset="0"/>
+              </a:rPr>
+              <a:t>…</a:t>
             </a:r>
             <a:r>
               <a:rPr lang="zh-CN" altLang="en-US" sz="1050" dirty="0" smtClean="0">
@@ -9401,82 +9009,37 @@
               <a:rPr lang="en-US" altLang="zh-CN" sz="1050" dirty="0" smtClean="0">
                 <a:ea typeface="Arial" charset="0"/>
               </a:rPr>
-              <a:t>His</a:t>
-            </a:r>
-            <a:r>
-              <a:rPr lang="zh-CN" altLang="en-US" sz="1050" dirty="0" smtClean="0">
+              <a:t>of </a:t>
+            </a:r>
+            <a:r>
+              <a:rPr lang="en-US" altLang="zh-CN" sz="1050" b="1" dirty="0" smtClean="0">
+                <a:solidFill>
+                  <a:srgbClr val="0070C0"/>
+                </a:solidFill>
                 <a:ea typeface="Arial" charset="0"/>
               </a:rPr>
-              <a:t> </a:t>
+              <a:t>the Criminal Law of the People’s Republic of China</a:t>
             </a:r>
             <a:r>
               <a:rPr lang="en-US" altLang="zh-CN" sz="1050" dirty="0" smtClean="0">
                 <a:ea typeface="Arial" charset="0"/>
               </a:rPr>
-              <a:t>acts constituted the crime of robbery. …… According to the </a:t>
+              <a:t>, </a:t>
             </a:r>
             <a:r>
               <a:rPr lang="en-US" altLang="zh-CN" sz="1050" b="1" dirty="0" smtClean="0">
                 <a:solidFill>
-                  <a:srgbClr val="0070C0"/>
+                  <a:srgbClr val="008136"/>
                 </a:solidFill>
                 <a:ea typeface="Arial" charset="0"/>
               </a:rPr>
-              <a:t>Article 263</a:t>
+              <a:t>the sentence is as follows</a:t>
             </a:r>
             <a:r>
               <a:rPr lang="en-US" altLang="zh-CN" sz="1050" dirty="0" smtClean="0">
                 <a:ea typeface="Arial" charset="0"/>
               </a:rPr>
-              <a:t>, </a:t>
-            </a:r>
-            <a:r>
-              <a:rPr lang="en-US" altLang="zh-CN" sz="1050" b="1" dirty="0" smtClean="0">
-                <a:solidFill>
-                  <a:srgbClr val="0070C0"/>
-                </a:solidFill>
-                <a:ea typeface="Arial" charset="0"/>
-              </a:rPr>
-              <a:t>Article 269</a:t>
-            </a:r>
-            <a:r>
-              <a:rPr lang="en-US" altLang="zh-CN" sz="1050" dirty="0" smtClean="0">
-                <a:ea typeface="Arial" charset="0"/>
-              </a:rPr>
-              <a:t>, </a:t>
-            </a:r>
-            <a:r>
-              <a:rPr lang="is-IS" altLang="zh-CN" sz="1050" dirty="0" smtClean="0">
-                <a:ea typeface="Arial" charset="0"/>
-              </a:rPr>
-              <a:t>…</a:t>
-            </a:r>
-            <a:r>
-              <a:rPr lang="zh-CN" altLang="en-US" sz="1050" dirty="0" smtClean="0">
-                <a:ea typeface="Arial" charset="0"/>
-              </a:rPr>
-              <a:t> </a:t>
-            </a:r>
-            <a:r>
-              <a:rPr lang="en-US" altLang="zh-CN" sz="1050" dirty="0" smtClean="0">
-                <a:ea typeface="Arial" charset="0"/>
-              </a:rPr>
-              <a:t>of </a:t>
-            </a:r>
-            <a:r>
-              <a:rPr lang="en-US" altLang="zh-CN" sz="1050" b="1" dirty="0" smtClean="0">
-                <a:solidFill>
-                  <a:srgbClr val="0070C0"/>
-                </a:solidFill>
-                <a:ea typeface="Arial" charset="0"/>
-              </a:rPr>
-              <a:t>the Criminal Law of the People’s Republic of China</a:t>
-            </a:r>
-            <a:r>
-              <a:rPr lang="en-US" altLang="zh-CN" sz="1050" dirty="0" smtClean="0">
-                <a:ea typeface="Arial" charset="0"/>
-              </a:rPr>
-              <a:t>, the sentence is as follows:</a:t>
+              <a:t>:</a:t>
             </a:r>
             <a:endParaRPr lang="zh-CN" altLang="zh-CN" sz="1050" dirty="0">
               <a:ea typeface="Arial" charset="0"/>
@@ -9508,11 +9071,21 @@
           <a:p>
             <a:pPr lvl="0"/>
             <a:r>
+              <a:rPr lang="zh-CN" altLang="zh-CN" sz="1100" b="1" dirty="0">
+                <a:solidFill>
+                  <a:srgbClr val="008136"/>
+                </a:solidFill>
+                <a:latin typeface="Arial Unicode MS" charset="0"/>
+                <a:ea typeface="Courier New" charset="0"/>
+              </a:rPr>
+              <a:t>本院认为</a:t>
+            </a:r>
+            <a:r>
               <a:rPr lang="zh-CN" altLang="zh-CN" sz="1100" dirty="0">
                 <a:latin typeface="Arial Unicode MS" charset="0"/>
                 <a:ea typeface="Courier New" charset="0"/>
               </a:rPr>
-              <a:t>本院认为，</a:t>
+              <a:t>，</a:t>
             </a:r>
             <a:r>
               <a:rPr lang="zh-CN" altLang="zh-CN" sz="1100" dirty="0" smtClean="0">
@@ -9616,14 +9189,24 @@
                 <a:latin typeface="Arial Unicode MS" charset="0"/>
                 <a:ea typeface="Courier New" charset="0"/>
               </a:rPr>
-              <a:t>之</a:t>
+              <a:t>之规定，</a:t>
+            </a:r>
+            <a:r>
+              <a:rPr lang="zh-CN" altLang="zh-CN" sz="1100" b="1" dirty="0">
+                <a:solidFill>
+                  <a:srgbClr val="008136"/>
+                </a:solidFill>
+                <a:latin typeface="Arial Unicode MS" charset="0"/>
+                <a:ea typeface="Courier New" charset="0"/>
+              </a:rPr>
+              <a:t>判决如下</a:t>
             </a:r>
             <a:r>
               <a:rPr lang="zh-CN" altLang="zh-CN" sz="1100" dirty="0">
                 <a:latin typeface="Arial Unicode MS" charset="0"/>
                 <a:ea typeface="Courier New" charset="0"/>
               </a:rPr>
-              <a:t>规定，判决如下： </a:t>
+              <a:t>： </a:t>
             </a:r>
           </a:p>
           <a:p>
@@ -9662,53 +9245,94 @@
               <a:t>…</a:t>
             </a:r>
             <a:r>
+              <a:rPr lang="zh-CN" altLang="zh-CN" sz="1100" b="1" dirty="0" smtClean="0">
+                <a:solidFill>
+                  <a:srgbClr val="008136"/>
+                </a:solidFill>
+                <a:latin typeface="Arial Unicode MS" charset="0"/>
+                <a:ea typeface="Courier New" charset="0"/>
+              </a:rPr>
+              <a:t>经</a:t>
+            </a:r>
+            <a:r>
+              <a:rPr lang="zh-CN" altLang="zh-CN" sz="1100" b="1" dirty="0">
+                <a:solidFill>
+                  <a:srgbClr val="008136"/>
+                </a:solidFill>
+                <a:latin typeface="Arial Unicode MS" charset="0"/>
+                <a:ea typeface="Courier New" charset="0"/>
+              </a:rPr>
+              <a:t>审理查明</a:t>
+            </a:r>
+            <a:r>
+              <a:rPr lang="zh-CN" altLang="zh-CN" sz="1100" dirty="0">
+                <a:latin typeface="Arial Unicode MS" charset="0"/>
+                <a:ea typeface="Courier New" charset="0"/>
+              </a:rPr>
+              <a:t>，2011年10月6日凌晨，</a:t>
+            </a:r>
+            <a:r>
               <a:rPr lang="zh-CN" altLang="zh-CN" sz="1100" dirty="0" smtClean="0">
                 <a:latin typeface="Arial Unicode MS" charset="0"/>
                 <a:ea typeface="Courier New" charset="0"/>
               </a:rPr>
-              <a:t>经</a:t>
+              <a:t>被告人</a:t>
+            </a:r>
+            <a:r>
+              <a:rPr lang="en-US" altLang="zh-CN" sz="1100" dirty="0" smtClean="0">
+                <a:latin typeface="Arial Unicode MS" charset="0"/>
+                <a:ea typeface="Courier New" charset="0"/>
+              </a:rPr>
+              <a:t>AA</a:t>
+            </a:r>
+            <a:r>
+              <a:rPr lang="zh-CN" altLang="zh-CN" sz="1100" dirty="0" smtClean="0">
+                <a:latin typeface="Arial Unicode MS" charset="0"/>
+                <a:ea typeface="Courier New" charset="0"/>
+              </a:rPr>
+              <a:t>携带</a:t>
             </a:r>
             <a:r>
               <a:rPr lang="zh-CN" altLang="zh-CN" sz="1100" dirty="0">
                 <a:latin typeface="Arial Unicode MS" charset="0"/>
                 <a:ea typeface="Courier New" charset="0"/>
               </a:rPr>
-              <a:t>审理查明，2011年10月6日凌晨，</a:t>
+              <a:t>改锥、扳手、破坏钳、刀等物品到尉氏县张市镇</a:t>
             </a:r>
             <a:r>
               <a:rPr lang="zh-CN" altLang="zh-CN" sz="1100" dirty="0" smtClean="0">
                 <a:latin typeface="Arial Unicode MS" charset="0"/>
                 <a:ea typeface="Courier New" charset="0"/>
               </a:rPr>
-              <a:t>被告人</a:t>
+              <a:t>尹庄村</a:t>
             </a:r>
             <a:r>
               <a:rPr lang="en-US" altLang="zh-CN" sz="1100" dirty="0" smtClean="0">
                 <a:latin typeface="Arial Unicode MS" charset="0"/>
                 <a:ea typeface="Courier New" charset="0"/>
               </a:rPr>
-              <a:t>AA</a:t>
+              <a:t>BB</a:t>
             </a:r>
             <a:r>
               <a:rPr lang="zh-CN" altLang="zh-CN" sz="1100" dirty="0" smtClean="0">
                 <a:latin typeface="Arial Unicode MS" charset="0"/>
                 <a:ea typeface="Courier New" charset="0"/>
               </a:rPr>
-              <a:t>携带</a:t>
+              <a:t>家门口</a:t>
             </a:r>
             <a:r>
               <a:rPr lang="zh-CN" altLang="zh-CN" sz="1100" dirty="0">
                 <a:latin typeface="Arial Unicode MS" charset="0"/>
                 <a:ea typeface="Courier New" charset="0"/>
               </a:rPr>
-              <a:t>改锥、扳手、破坏钳、刀等物品到尉氏县张市镇</a:t>
+              <a:t>盗窃农用车上的电瓶时被</a:t>
             </a:r>
             <a:r>
               <a:rPr lang="zh-CN" altLang="zh-CN" sz="1100" dirty="0" smtClean="0">
                 <a:latin typeface="Arial Unicode MS" charset="0"/>
                 <a:ea typeface="Courier New" charset="0"/>
               </a:rPr>
-              <a:t>尹庄村</a:t>
+              <a:t>被害人</a:t>
             </a:r>
             <a:r>
               <a:rPr lang="en-US" altLang="zh-CN" sz="1100" dirty="0" smtClean="0">
@@ -9722,90 +9346,55 @@
                 <a:latin typeface="Arial Unicode MS" charset="0"/>
                 <a:ea typeface="Courier New" charset="0"/>
               </a:rPr>
-              <a:t>家门口</a:t>
+              <a:t>发现</a:t>
             </a:r>
             <a:r>
               <a:rPr lang="zh-CN" altLang="zh-CN" sz="1100" dirty="0">
                 <a:latin typeface="Arial Unicode MS" charset="0"/>
                 <a:ea typeface="Courier New" charset="0"/>
               </a:rPr>
-              <a:t>盗窃农用车上的电瓶时被</a:t>
+              <a:t>，在逃跑过程</a:t>
             </a:r>
             <a:r>
               <a:rPr lang="zh-CN" altLang="zh-CN" sz="1100" dirty="0" smtClean="0">
                 <a:latin typeface="Arial Unicode MS" charset="0"/>
                 <a:ea typeface="Courier New" charset="0"/>
               </a:rPr>
-              <a:t>被害人</a:t>
+              <a:t>中</a:t>
             </a:r>
             <a:r>
               <a:rPr lang="en-US" altLang="zh-CN" sz="1100" dirty="0" smtClean="0">
                 <a:latin typeface="Arial Unicode MS" charset="0"/>
                 <a:ea typeface="Courier New" charset="0"/>
               </a:rPr>
-              <a:t>BB</a:t>
+              <a:t>AA</a:t>
             </a:r>
             <a:r>
               <a:rPr lang="zh-CN" altLang="zh-CN" sz="1100" dirty="0" smtClean="0">
                 <a:latin typeface="Arial Unicode MS" charset="0"/>
                 <a:ea typeface="Courier New" charset="0"/>
               </a:rPr>
-              <a:t>发现</a:t>
+              <a:t>为</a:t>
             </a:r>
             <a:r>
               <a:rPr lang="zh-CN" altLang="zh-CN" sz="1100" dirty="0">
                 <a:latin typeface="Arial Unicode MS" charset="0"/>
                 <a:ea typeface="Courier New" charset="0"/>
               </a:rPr>
-              <a:t>，在逃跑过程</a:t>
+              <a:t>抗拒抓捕持刀将</a:t>
+            </a:r>
+            <a:r>
+              <a:rPr lang="en-US" altLang="zh-CN" sz="1100" dirty="0" smtClean="0">
+                <a:latin typeface="Arial Unicode MS" charset="0"/>
+                <a:ea typeface="Courier New" charset="0"/>
+              </a:rPr>
+              <a:t>BB</a:t>
             </a:r>
             <a:r>
               <a:rPr lang="zh-CN" altLang="zh-CN" sz="1100" dirty="0" smtClean="0">
                 <a:latin typeface="Arial Unicode MS" charset="0"/>
                 <a:ea typeface="Courier New" charset="0"/>
               </a:rPr>
-              <a:t>中</a:t>
-            </a:r>
-            <a:r>
-              <a:rPr lang="en-US" altLang="zh-CN" sz="1100" dirty="0" smtClean="0">
-                <a:latin typeface="Arial Unicode MS" charset="0"/>
-                <a:ea typeface="Courier New" charset="0"/>
-              </a:rPr>
-              <a:t>AA</a:t>
-            </a:r>
-            <a:r>
-              <a:rPr lang="zh-CN" altLang="zh-CN" sz="1100" dirty="0" smtClean="0">
-                <a:latin typeface="Arial Unicode MS" charset="0"/>
-                <a:ea typeface="Courier New" charset="0"/>
-              </a:rPr>
-              <a:t>为</a:t>
-            </a:r>
-            <a:r>
-              <a:rPr lang="zh-CN" altLang="zh-CN" sz="1100" dirty="0">
-                <a:latin typeface="Arial Unicode MS" charset="0"/>
-                <a:ea typeface="Courier New" charset="0"/>
-              </a:rPr>
-              <a:t>抗拒抓捕持刀</a:t>
-            </a:r>
-            <a:r>
-              <a:rPr lang="zh-CN" altLang="zh-CN" sz="1100" dirty="0">
-                <a:latin typeface="Arial Unicode MS" charset="0"/>
-                <a:ea typeface="Courier New" charset="0"/>
-              </a:rPr>
-              <a:t>将</a:t>
-            </a:r>
-            <a:r>
-              <a:rPr lang="en-US" altLang="zh-CN" sz="1100" dirty="0" smtClean="0">
-                <a:latin typeface="Arial Unicode MS" charset="0"/>
-                <a:ea typeface="Courier New" charset="0"/>
-              </a:rPr>
-              <a:t>BB</a:t>
-            </a:r>
-            <a:r>
-              <a:rPr lang="zh-CN" altLang="zh-CN" sz="1100" dirty="0" smtClean="0">
-                <a:latin typeface="Arial Unicode MS" charset="0"/>
-                <a:ea typeface="Courier New" charset="0"/>
-              </a:rPr>
               <a:t>致伤</a:t>
             </a:r>
             <a:r>
@@ -9830,7 +9419,7 @@
         </p:nvSpPr>
         <p:spPr>
           <a:xfrm>
-            <a:off x="3527153" y="620799"/>
+            <a:off x="3527153" y="116743"/>
             <a:ext cx="3975440" cy="430887"/>
           </a:xfrm>
           <a:prstGeom prst="rect">
@@ -9878,21 +9467,7 @@
                 <a:latin typeface="Arial Unicode MS" charset="0"/>
                 <a:ea typeface="Courier New" charset="0"/>
               </a:rPr>
-              <a:t>劫罪，于2011年11月16日向本院提起公诉，</a:t>
-            </a:r>
-            <a:r>
-              <a:rPr lang="zh-CN" altLang="zh-CN" sz="1100" dirty="0">
-                <a:latin typeface="Arial Unicode MS" charset="0"/>
-                <a:ea typeface="Courier New" charset="0"/>
-              </a:rPr>
-              <a:t>… </a:t>
-            </a:r>
-            <a:r>
-              <a:rPr lang="zh-CN" altLang="zh-CN" sz="1100" dirty="0">
-                <a:latin typeface="Arial Unicode MS" charset="0"/>
-                <a:ea typeface="Courier New" charset="0"/>
-              </a:rPr>
-              <a:t>现已审理终结。</a:t>
+              <a:t>劫罪，于2011年11月16日向本院提起公诉，… 现已审理终结。</a:t>
             </a:r>
             <a:r>
               <a:rPr lang="zh-CN" altLang="zh-CN" sz="1100" dirty="0"/>
@@ -9969,14 +9544,7 @@
                 <a:latin typeface="Arial Unicode MS" charset="0"/>
                 <a:ea typeface="Courier New" charset="0"/>
               </a:rPr>
-              <a:t>，判处有期徒三年，并处罚金人民币一千元</a:t>
-            </a:r>
-            <a:r>
-              <a:rPr lang="zh-CN" altLang="en-US" sz="1100" dirty="0">
-                <a:latin typeface="Arial Unicode MS" charset="0"/>
-                <a:ea typeface="Courier New" charset="0"/>
-              </a:rPr>
-              <a:t>。</a:t>
+              <a:t>，判处有期徒三年，并处罚金人民币一千元。</a:t>
             </a:r>
             <a:r>
               <a:rPr lang="is-IS" altLang="zh-CN" sz="1100" dirty="0">
@@ -10032,23 +9600,7 @@
             </a:r>
             <a:r>
               <a:rPr kumimoji="1" lang="en-US" altLang="zh-CN" sz="1050" dirty="0"/>
-              <a:t>, and shall be </a:t>
-            </a:r>
-            <a:r>
-              <a:rPr kumimoji="1" lang="en-US" altLang="zh-CN" sz="1050" dirty="0"/>
-              <a:t>sentenced to </a:t>
-            </a:r>
-            <a:r>
-              <a:rPr kumimoji="1" lang="en-US" altLang="zh-CN" sz="1050" dirty="0"/>
-              <a:t>a </a:t>
-            </a:r>
-            <a:r>
-              <a:rPr kumimoji="1" lang="en-US" altLang="zh-CN" sz="1050" dirty="0"/>
-              <a:t>fixed-term imprisonment of 3 years and a fine of 1000 yuan</a:t>
-            </a:r>
-            <a:r>
-              <a:rPr kumimoji="1" lang="en-US" altLang="zh-CN" sz="1050" dirty="0"/>
-              <a:t>.</a:t>
+              <a:t>, and shall be sentenced to a fixed-term imprisonment of 3 years and a fine of 1000 yuan.</a:t>
             </a:r>
             <a:r>
               <a:rPr kumimoji="1" lang="zh-CN" altLang="en-US" sz="1050" dirty="0"/>
@@ -10070,7 +9622,7 @@
         </p:nvSpPr>
         <p:spPr>
           <a:xfrm>
-            <a:off x="12237727" y="659160"/>
+            <a:off x="12237727" y="155104"/>
             <a:ext cx="1010213" cy="292388"/>
           </a:xfrm>
           <a:prstGeom prst="rect">
@@ -10182,6 +9734,150 @@
           </a:p>
         </p:txBody>
       </p:sp>
+      <p:pic>
+        <p:nvPicPr>
+          <p:cNvPr id="5" name="图片 4"/>
+          <p:cNvPicPr>
+            <a:picLocks noChangeAspect="1"/>
+          </p:cNvPicPr>
+          <p:nvPr/>
+        </p:nvPicPr>
+        <p:blipFill>
+          <a:blip r:embed="rId3"/>
+          <a:stretch>
+            <a:fillRect/>
+          </a:stretch>
+        </p:blipFill>
+        <p:spPr>
+          <a:xfrm>
+            <a:off x="6047433" y="2331200"/>
+            <a:ext cx="279400" cy="279400"/>
+          </a:xfrm>
+          <a:prstGeom prst="rect">
+            <a:avLst/>
+          </a:prstGeom>
+        </p:spPr>
+      </p:pic>
+      <p:pic>
+        <p:nvPicPr>
+          <p:cNvPr id="31" name="图片 30"/>
+          <p:cNvPicPr>
+            <a:picLocks noChangeAspect="1"/>
+          </p:cNvPicPr>
+          <p:nvPr/>
+        </p:nvPicPr>
+        <p:blipFill>
+          <a:blip r:embed="rId3"/>
+          <a:stretch>
+            <a:fillRect/>
+          </a:stretch>
+        </p:blipFill>
+        <p:spPr>
+          <a:xfrm>
+            <a:off x="11240641" y="2326471"/>
+            <a:ext cx="279400" cy="279400"/>
+          </a:xfrm>
+          <a:prstGeom prst="rect">
+            <a:avLst/>
+          </a:prstGeom>
+        </p:spPr>
+      </p:pic>
+      <p:pic>
+        <p:nvPicPr>
+          <p:cNvPr id="6" name="图片 5"/>
+          <p:cNvPicPr>
+            <a:picLocks noChangeAspect="1"/>
+          </p:cNvPicPr>
+          <p:nvPr/>
+        </p:nvPicPr>
+        <p:blipFill>
+          <a:blip r:embed="rId4"/>
+          <a:stretch>
+            <a:fillRect/>
+          </a:stretch>
+        </p:blipFill>
+        <p:spPr>
+          <a:xfrm>
+            <a:off x="3335642" y="1797289"/>
+            <a:ext cx="279400" cy="279400"/>
+          </a:xfrm>
+          <a:prstGeom prst="rect">
+            <a:avLst/>
+          </a:prstGeom>
+        </p:spPr>
+      </p:pic>
+      <p:pic>
+        <p:nvPicPr>
+          <p:cNvPr id="33" name="图片 32"/>
+          <p:cNvPicPr>
+            <a:picLocks noChangeAspect="1"/>
+          </p:cNvPicPr>
+          <p:nvPr/>
+        </p:nvPicPr>
+        <p:blipFill>
+          <a:blip r:embed="rId4"/>
+          <a:stretch>
+            <a:fillRect/>
+          </a:stretch>
+        </p:blipFill>
+        <p:spPr>
+          <a:xfrm>
+            <a:off x="7426204" y="1797289"/>
+            <a:ext cx="279400" cy="279400"/>
+          </a:xfrm>
+          <a:prstGeom prst="rect">
+            <a:avLst/>
+          </a:prstGeom>
+        </p:spPr>
+      </p:pic>
+      <p:pic>
+        <p:nvPicPr>
+          <p:cNvPr id="8" name="图片 7"/>
+          <p:cNvPicPr>
+            <a:picLocks noChangeAspect="1"/>
+          </p:cNvPicPr>
+          <p:nvPr/>
+        </p:nvPicPr>
+        <p:blipFill>
+          <a:blip r:embed="rId5"/>
+          <a:stretch>
+            <a:fillRect/>
+          </a:stretch>
+        </p:blipFill>
+        <p:spPr>
+          <a:xfrm>
+            <a:off x="7414704" y="1047608"/>
+            <a:ext cx="279400" cy="279400"/>
+          </a:xfrm>
+          <a:prstGeom prst="rect">
+            <a:avLst/>
+          </a:prstGeom>
+        </p:spPr>
+      </p:pic>
+      <p:pic>
+        <p:nvPicPr>
+          <p:cNvPr id="34" name="图片 33"/>
+          <p:cNvPicPr>
+            <a:picLocks noChangeAspect="1"/>
+          </p:cNvPicPr>
+          <p:nvPr/>
+        </p:nvPicPr>
+        <p:blipFill>
+          <a:blip r:embed="rId6"/>
+          <a:stretch>
+            <a:fillRect/>
+          </a:stretch>
+        </p:blipFill>
+        <p:spPr>
+          <a:xfrm>
+            <a:off x="3335642" y="1087845"/>
+            <a:ext cx="279400" cy="279400"/>
+          </a:xfrm>
+          <a:prstGeom prst="rect">
+            <a:avLst/>
+          </a:prstGeom>
+        </p:spPr>
+      </p:pic>
     </p:spTree>
     <p:extLst>
       <p:ext uri="{BB962C8B-B14F-4D97-AF65-F5344CB8AC3E}">

</xml_diff>

<commit_message>
update exp, minor in various places
</commit_message>
<xml_diff>
--- a/figures/pic_raw.pptx
+++ b/figures/pic_raw.pptx
@@ -9033,7 +9033,25 @@
                 </a:solidFill>
                 <a:ea typeface="Arial" charset="0"/>
               </a:rPr>
-              <a:t>the sentence is as follows</a:t>
+              <a:t>the </a:t>
+            </a:r>
+            <a:r>
+              <a:rPr lang="en-US" altLang="zh-CN" sz="1050" b="1" dirty="0" smtClean="0">
+                <a:solidFill>
+                  <a:srgbClr val="008136"/>
+                </a:solidFill>
+                <a:ea typeface="Arial" charset="0"/>
+              </a:rPr>
+              <a:t>decisions are as </a:t>
+            </a:r>
+            <a:r>
+              <a:rPr lang="en-US" altLang="zh-CN" sz="1050" b="1" dirty="0" smtClean="0">
+                <a:solidFill>
+                  <a:srgbClr val="008136"/>
+                </a:solidFill>
+                <a:ea typeface="Arial" charset="0"/>
+              </a:rPr>
+              <a:t>follows</a:t>
             </a:r>
             <a:r>
               <a:rPr lang="en-US" altLang="zh-CN" sz="1050" dirty="0" smtClean="0">
@@ -9631,7 +9649,7 @@
         </p:nvSpPr>
         <p:spPr>
           <a:xfrm>
-            <a:off x="12401429" y="1196752"/>
+            <a:off x="12409923" y="1192396"/>
             <a:ext cx="622286" cy="292388"/>
           </a:xfrm>
           <a:prstGeom prst="rect">
@@ -9691,8 +9709,8 @@
         </p:nvSpPr>
         <p:spPr>
           <a:xfrm>
-            <a:off x="12300340" y="2564904"/>
-            <a:ext cx="928459" cy="292388"/>
+            <a:off x="12319383" y="2601975"/>
+            <a:ext cx="889985" cy="292388"/>
           </a:xfrm>
           <a:prstGeom prst="rect">
             <a:avLst/>
@@ -9700,14 +9718,14 @@
           <a:noFill/>
         </p:spPr>
         <p:txBody>
-          <a:bodyPr wrap="none" rtlCol="0">
+          <a:bodyPr wrap="square" rtlCol="0">
             <a:spAutoFit/>
           </a:bodyPr>
           <a:lstStyle/>
           <a:p>
             <a:r>
-              <a:rPr kumimoji="1" lang="en-US" altLang="zh-CN" sz="1300" b="1" dirty="0"/>
-              <a:t>Sentence</a:t>
+              <a:rPr kumimoji="1" lang="en-US" altLang="zh-CN" sz="1300" b="1" dirty="0" smtClean="0"/>
+              <a:t>Decision</a:t>
             </a:r>
             <a:endParaRPr kumimoji="1" lang="zh-CN" altLang="en-US" sz="1300" b="1" dirty="0"/>
           </a:p>
@@ -9952,8 +9970,8 @@
         </p:nvSpPr>
         <p:spPr>
           <a:xfrm>
-            <a:off x="9478957" y="2318681"/>
-            <a:ext cx="1765692" cy="177384"/>
+            <a:off x="9478956" y="2318681"/>
+            <a:ext cx="1852189" cy="177384"/>
           </a:xfrm>
           <a:prstGeom prst="rect">
             <a:avLst/>

</xml_diff>